<commit_message>
Brain wide poster update
update to posters after feedback from Dennis & me finding that a figure caption would help
</commit_message>
<xml_diff>
--- a/Brain_wide_associations_HBM.pptx
+++ b/Brain_wide_associations_HBM.pptx
@@ -36,7 +36,7 @@
             <a:spLocks noGrp="1"/>
           </p:cNvSpPr>
           <p:nvPr>
-            <p:ph type="ftr" idx="2"/>
+            <p:ph type="ftr" idx="1"/>
           </p:nvPr>
         </p:nvSpPr>
         <p:spPr/>
@@ -56,14 +56,14 @@
             <a:spLocks noGrp="1"/>
           </p:cNvSpPr>
           <p:nvPr>
-            <p:ph type="sldNum" idx="3"/>
+            <p:ph type="sldNum" idx="2"/>
           </p:nvPr>
         </p:nvSpPr>
         <p:spPr/>
         <p:txBody>
           <a:bodyPr/>
           <a:p>
-            <a:fld id="{1F390106-3482-4586-AA32-F048CF9734B9}" type="slidenum">
+            <a:fld id="{9BA131D0-4C44-4320-8063-532A8A970174}" type="slidenum">
               <a:t>&lt;#&gt;</a:t>
             </a:fld>
           </a:p>
@@ -76,7 +76,7 @@
             <a:spLocks noGrp="1"/>
           </p:cNvSpPr>
           <p:nvPr>
-            <p:ph type="dt" idx="1"/>
+            <p:ph type="dt" idx="3"/>
           </p:nvPr>
         </p:nvSpPr>
         <p:spPr/>
@@ -125,7 +125,7 @@
         <p:spPr>
           <a:xfrm>
             <a:off x="2400120" y="6734160"/>
-            <a:ext cx="27203040" cy="14325480"/>
+            <a:ext cx="27202320" cy="14324760"/>
           </a:xfrm>
           <a:prstGeom prst="rect">
             <a:avLst/>
@@ -140,11 +140,11 @@
             <a:noAutofit/>
           </a:bodyPr>
           <a:p>
-            <a:endParaRPr b="0" lang="en-US" sz="1729" spc="-1" strike="noStrike">
-              <a:solidFill>
-                <a:srgbClr val="000000"/>
-              </a:solidFill>
-              <a:latin typeface="Calibri"/>
+            <a:pPr algn="ctr">
+              <a:buNone/>
+            </a:pPr>
+            <a:endParaRPr b="0" lang="en-GB" sz="4400" spc="-1" strike="noStrike">
+              <a:latin typeface="Arial"/>
             </a:endParaRPr>
           </a:p>
         </p:txBody>
@@ -161,8 +161,8 @@
         </p:nvSpPr>
         <p:spPr>
           <a:xfrm>
-            <a:off x="1599840" y="9628200"/>
-            <a:ext cx="28803240" cy="11383560"/>
+            <a:off x="1600200" y="9628560"/>
+            <a:ext cx="28802880" cy="11383560"/>
           </a:xfrm>
           <a:prstGeom prst="rect">
             <a:avLst/>
@@ -177,20 +177,8 @@
             <a:normAutofit/>
           </a:bodyPr>
           <a:p>
-            <a:pPr>
-              <a:lnSpc>
-                <a:spcPct val="90000"/>
-              </a:lnSpc>
-              <a:spcBef>
-                <a:spcPts val="1361"/>
-              </a:spcBef>
-              <a:buNone/>
-            </a:pPr>
-            <a:endParaRPr b="0" lang="en-US" sz="8910" spc="-1" strike="noStrike">
-              <a:solidFill>
-                <a:srgbClr val="000000"/>
-              </a:solidFill>
-              <a:latin typeface="Calibri"/>
+            <a:endParaRPr b="0" lang="en-GB" sz="3200" spc="-1" strike="noStrike">
+              <a:latin typeface="Arial"/>
             </a:endParaRPr>
           </a:p>
         </p:txBody>
@@ -207,8 +195,8 @@
         </p:nvSpPr>
         <p:spPr>
           <a:xfrm>
-            <a:off x="1599840" y="22093560"/>
-            <a:ext cx="28803240" cy="11383560"/>
+            <a:off x="1600200" y="22093920"/>
+            <a:ext cx="28802880" cy="11383560"/>
           </a:xfrm>
           <a:prstGeom prst="rect">
             <a:avLst/>
@@ -223,20 +211,8 @@
             <a:normAutofit/>
           </a:bodyPr>
           <a:p>
-            <a:pPr>
-              <a:lnSpc>
-                <a:spcPct val="90000"/>
-              </a:lnSpc>
-              <a:spcBef>
-                <a:spcPts val="1361"/>
-              </a:spcBef>
-              <a:buNone/>
-            </a:pPr>
-            <a:endParaRPr b="0" lang="en-US" sz="8910" spc="-1" strike="noStrike">
-              <a:solidFill>
-                <a:srgbClr val="000000"/>
-              </a:solidFill>
-              <a:latin typeface="Calibri"/>
+            <a:endParaRPr b="0" lang="en-GB" sz="3200" spc="-1" strike="noStrike">
+              <a:latin typeface="Arial"/>
             </a:endParaRPr>
           </a:p>
         </p:txBody>
@@ -248,7 +224,7 @@
             <a:spLocks noGrp="1"/>
           </p:cNvSpPr>
           <p:nvPr>
-            <p:ph type="ftr" idx="2"/>
+            <p:ph type="ftr" idx="1"/>
           </p:nvPr>
         </p:nvSpPr>
         <p:spPr/>
@@ -268,14 +244,14 @@
             <a:spLocks noGrp="1"/>
           </p:cNvSpPr>
           <p:nvPr>
-            <p:ph type="sldNum" idx="3"/>
+            <p:ph type="sldNum" idx="2"/>
           </p:nvPr>
         </p:nvSpPr>
         <p:spPr/>
         <p:txBody>
           <a:bodyPr/>
           <a:p>
-            <a:fld id="{02EAEB84-3560-4FE4-941F-552FC930FAD3}" type="slidenum">
+            <a:fld id="{B24544A2-21A0-4A9E-8DF0-017F5301D2D9}" type="slidenum">
               <a:t>&lt;#&gt;</a:t>
             </a:fld>
           </a:p>
@@ -288,7 +264,7 @@
             <a:spLocks noGrp="1"/>
           </p:cNvSpPr>
           <p:nvPr>
-            <p:ph type="dt" idx="1"/>
+            <p:ph type="dt" idx="3"/>
           </p:nvPr>
         </p:nvSpPr>
         <p:spPr/>
@@ -337,7 +313,7 @@
         <p:spPr>
           <a:xfrm>
             <a:off x="2400120" y="6734160"/>
-            <a:ext cx="27203040" cy="14325480"/>
+            <a:ext cx="27202320" cy="14324760"/>
           </a:xfrm>
           <a:prstGeom prst="rect">
             <a:avLst/>
@@ -352,11 +328,11 @@
             <a:noAutofit/>
           </a:bodyPr>
           <a:p>
-            <a:endParaRPr b="0" lang="en-US" sz="1729" spc="-1" strike="noStrike">
-              <a:solidFill>
-                <a:srgbClr val="000000"/>
-              </a:solidFill>
-              <a:latin typeface="Calibri"/>
+            <a:pPr algn="ctr">
+              <a:buNone/>
+            </a:pPr>
+            <a:endParaRPr b="0" lang="en-GB" sz="4400" spc="-1" strike="noStrike">
+              <a:latin typeface="Arial"/>
             </a:endParaRPr>
           </a:p>
         </p:txBody>
@@ -373,8 +349,8 @@
         </p:nvSpPr>
         <p:spPr>
           <a:xfrm>
-            <a:off x="1599840" y="9628200"/>
-            <a:ext cx="14055840" cy="11383560"/>
+            <a:off x="1600200" y="9628560"/>
+            <a:ext cx="14055480" cy="11383560"/>
           </a:xfrm>
           <a:prstGeom prst="rect">
             <a:avLst/>
@@ -389,20 +365,8 @@
             <a:normAutofit/>
           </a:bodyPr>
           <a:p>
-            <a:pPr>
-              <a:lnSpc>
-                <a:spcPct val="90000"/>
-              </a:lnSpc>
-              <a:spcBef>
-                <a:spcPts val="1361"/>
-              </a:spcBef>
-              <a:buNone/>
-            </a:pPr>
-            <a:endParaRPr b="0" lang="en-US" sz="8910" spc="-1" strike="noStrike">
-              <a:solidFill>
-                <a:srgbClr val="000000"/>
-              </a:solidFill>
-              <a:latin typeface="Calibri"/>
+            <a:endParaRPr b="0" lang="en-GB" sz="3200" spc="-1" strike="noStrike">
+              <a:latin typeface="Arial"/>
             </a:endParaRPr>
           </a:p>
         </p:txBody>
@@ -419,8 +383,8 @@
         </p:nvSpPr>
         <p:spPr>
           <a:xfrm>
-            <a:off x="16358760" y="9628200"/>
-            <a:ext cx="14055840" cy="11383560"/>
+            <a:off x="16358760" y="9628560"/>
+            <a:ext cx="14055480" cy="11383560"/>
           </a:xfrm>
           <a:prstGeom prst="rect">
             <a:avLst/>
@@ -435,20 +399,8 @@
             <a:normAutofit/>
           </a:bodyPr>
           <a:p>
-            <a:pPr>
-              <a:lnSpc>
-                <a:spcPct val="90000"/>
-              </a:lnSpc>
-              <a:spcBef>
-                <a:spcPts val="1361"/>
-              </a:spcBef>
-              <a:buNone/>
-            </a:pPr>
-            <a:endParaRPr b="0" lang="en-US" sz="8910" spc="-1" strike="noStrike">
-              <a:solidFill>
-                <a:srgbClr val="000000"/>
-              </a:solidFill>
-              <a:latin typeface="Calibri"/>
+            <a:endParaRPr b="0" lang="en-GB" sz="3200" spc="-1" strike="noStrike">
+              <a:latin typeface="Arial"/>
             </a:endParaRPr>
           </a:p>
         </p:txBody>
@@ -465,8 +417,8 @@
         </p:nvSpPr>
         <p:spPr>
           <a:xfrm>
-            <a:off x="1599840" y="22093560"/>
-            <a:ext cx="14055840" cy="11383560"/>
+            <a:off x="1600200" y="22093920"/>
+            <a:ext cx="14055480" cy="11383560"/>
           </a:xfrm>
           <a:prstGeom prst="rect">
             <a:avLst/>
@@ -481,20 +433,8 @@
             <a:normAutofit/>
           </a:bodyPr>
           <a:p>
-            <a:pPr>
-              <a:lnSpc>
-                <a:spcPct val="90000"/>
-              </a:lnSpc>
-              <a:spcBef>
-                <a:spcPts val="1361"/>
-              </a:spcBef>
-              <a:buNone/>
-            </a:pPr>
-            <a:endParaRPr b="0" lang="en-US" sz="8910" spc="-1" strike="noStrike">
-              <a:solidFill>
-                <a:srgbClr val="000000"/>
-              </a:solidFill>
-              <a:latin typeface="Calibri"/>
+            <a:endParaRPr b="0" lang="en-GB" sz="3200" spc="-1" strike="noStrike">
+              <a:latin typeface="Arial"/>
             </a:endParaRPr>
           </a:p>
         </p:txBody>
@@ -511,8 +451,8 @@
         </p:nvSpPr>
         <p:spPr>
           <a:xfrm>
-            <a:off x="16358760" y="22093560"/>
-            <a:ext cx="14055840" cy="11383560"/>
+            <a:off x="16358760" y="22093920"/>
+            <a:ext cx="14055480" cy="11383560"/>
           </a:xfrm>
           <a:prstGeom prst="rect">
             <a:avLst/>
@@ -527,20 +467,8 @@
             <a:normAutofit/>
           </a:bodyPr>
           <a:p>
-            <a:pPr>
-              <a:lnSpc>
-                <a:spcPct val="90000"/>
-              </a:lnSpc>
-              <a:spcBef>
-                <a:spcPts val="1361"/>
-              </a:spcBef>
-              <a:buNone/>
-            </a:pPr>
-            <a:endParaRPr b="0" lang="en-US" sz="8910" spc="-1" strike="noStrike">
-              <a:solidFill>
-                <a:srgbClr val="000000"/>
-              </a:solidFill>
-              <a:latin typeface="Calibri"/>
+            <a:endParaRPr b="0" lang="en-GB" sz="3200" spc="-1" strike="noStrike">
+              <a:latin typeface="Arial"/>
             </a:endParaRPr>
           </a:p>
         </p:txBody>
@@ -552,7 +480,7 @@
             <a:spLocks noGrp="1"/>
           </p:cNvSpPr>
           <p:nvPr>
-            <p:ph type="ftr" idx="2"/>
+            <p:ph type="ftr" idx="1"/>
           </p:nvPr>
         </p:nvSpPr>
         <p:spPr/>
@@ -572,14 +500,14 @@
             <a:spLocks noGrp="1"/>
           </p:cNvSpPr>
           <p:nvPr>
-            <p:ph type="sldNum" idx="3"/>
+            <p:ph type="sldNum" idx="2"/>
           </p:nvPr>
         </p:nvSpPr>
         <p:spPr/>
         <p:txBody>
           <a:bodyPr/>
           <a:p>
-            <a:fld id="{A853A5B1-2155-41B3-B567-25F80876D3A7}" type="slidenum">
+            <a:fld id="{6E66C42F-E7F8-4B77-AF58-1C4616B5EBF8}" type="slidenum">
               <a:t>&lt;#&gt;</a:t>
             </a:fld>
           </a:p>
@@ -592,7 +520,7 @@
             <a:spLocks noGrp="1"/>
           </p:cNvSpPr>
           <p:nvPr>
-            <p:ph type="dt" idx="1"/>
+            <p:ph type="dt" idx="3"/>
           </p:nvPr>
         </p:nvSpPr>
         <p:spPr/>
@@ -641,7 +569,7 @@
         <p:spPr>
           <a:xfrm>
             <a:off x="2400120" y="6734160"/>
-            <a:ext cx="27203040" cy="14325480"/>
+            <a:ext cx="27202320" cy="14324760"/>
           </a:xfrm>
           <a:prstGeom prst="rect">
             <a:avLst/>
@@ -656,11 +584,11 @@
             <a:noAutofit/>
           </a:bodyPr>
           <a:p>
-            <a:endParaRPr b="0" lang="en-US" sz="1729" spc="-1" strike="noStrike">
-              <a:solidFill>
-                <a:srgbClr val="000000"/>
-              </a:solidFill>
-              <a:latin typeface="Calibri"/>
+            <a:pPr algn="ctr">
+              <a:buNone/>
+            </a:pPr>
+            <a:endParaRPr b="0" lang="en-GB" sz="4400" spc="-1" strike="noStrike">
+              <a:latin typeface="Arial"/>
             </a:endParaRPr>
           </a:p>
         </p:txBody>
@@ -677,7 +605,7 @@
         </p:nvSpPr>
         <p:spPr>
           <a:xfrm>
-            <a:off x="1599840" y="9628200"/>
+            <a:off x="1600200" y="9628560"/>
             <a:ext cx="9274320" cy="11383560"/>
           </a:xfrm>
           <a:prstGeom prst="rect">
@@ -693,20 +621,8 @@
             <a:normAutofit/>
           </a:bodyPr>
           <a:p>
-            <a:pPr>
-              <a:lnSpc>
-                <a:spcPct val="90000"/>
-              </a:lnSpc>
-              <a:spcBef>
-                <a:spcPts val="1361"/>
-              </a:spcBef>
-              <a:buNone/>
-            </a:pPr>
-            <a:endParaRPr b="0" lang="en-US" sz="8910" spc="-1" strike="noStrike">
-              <a:solidFill>
-                <a:srgbClr val="000000"/>
-              </a:solidFill>
-              <a:latin typeface="Calibri"/>
+            <a:endParaRPr b="0" lang="en-GB" sz="3200" spc="-1" strike="noStrike">
+              <a:latin typeface="Arial"/>
             </a:endParaRPr>
           </a:p>
         </p:txBody>
@@ -723,7 +639,7 @@
         </p:nvSpPr>
         <p:spPr>
           <a:xfrm>
-            <a:off x="11338200" y="9628200"/>
+            <a:off x="11338560" y="9628560"/>
             <a:ext cx="9274320" cy="11383560"/>
           </a:xfrm>
           <a:prstGeom prst="rect">
@@ -739,20 +655,8 @@
             <a:normAutofit/>
           </a:bodyPr>
           <a:p>
-            <a:pPr>
-              <a:lnSpc>
-                <a:spcPct val="90000"/>
-              </a:lnSpc>
-              <a:spcBef>
-                <a:spcPts val="1361"/>
-              </a:spcBef>
-              <a:buNone/>
-            </a:pPr>
-            <a:endParaRPr b="0" lang="en-US" sz="8910" spc="-1" strike="noStrike">
-              <a:solidFill>
-                <a:srgbClr val="000000"/>
-              </a:solidFill>
-              <a:latin typeface="Calibri"/>
+            <a:endParaRPr b="0" lang="en-GB" sz="3200" spc="-1" strike="noStrike">
+              <a:latin typeface="Arial"/>
             </a:endParaRPr>
           </a:p>
         </p:txBody>
@@ -769,7 +673,7 @@
         </p:nvSpPr>
         <p:spPr>
           <a:xfrm>
-            <a:off x="21076560" y="9628200"/>
+            <a:off x="21076920" y="9628560"/>
             <a:ext cx="9274320" cy="11383560"/>
           </a:xfrm>
           <a:prstGeom prst="rect">
@@ -785,20 +689,8 @@
             <a:normAutofit/>
           </a:bodyPr>
           <a:p>
-            <a:pPr>
-              <a:lnSpc>
-                <a:spcPct val="90000"/>
-              </a:lnSpc>
-              <a:spcBef>
-                <a:spcPts val="1361"/>
-              </a:spcBef>
-              <a:buNone/>
-            </a:pPr>
-            <a:endParaRPr b="0" lang="en-US" sz="8910" spc="-1" strike="noStrike">
-              <a:solidFill>
-                <a:srgbClr val="000000"/>
-              </a:solidFill>
-              <a:latin typeface="Calibri"/>
+            <a:endParaRPr b="0" lang="en-GB" sz="3200" spc="-1" strike="noStrike">
+              <a:latin typeface="Arial"/>
             </a:endParaRPr>
           </a:p>
         </p:txBody>
@@ -815,7 +707,7 @@
         </p:nvSpPr>
         <p:spPr>
           <a:xfrm>
-            <a:off x="1599840" y="22093560"/>
+            <a:off x="1600200" y="22093920"/>
             <a:ext cx="9274320" cy="11383560"/>
           </a:xfrm>
           <a:prstGeom prst="rect">
@@ -831,20 +723,8 @@
             <a:normAutofit/>
           </a:bodyPr>
           <a:p>
-            <a:pPr>
-              <a:lnSpc>
-                <a:spcPct val="90000"/>
-              </a:lnSpc>
-              <a:spcBef>
-                <a:spcPts val="1361"/>
-              </a:spcBef>
-              <a:buNone/>
-            </a:pPr>
-            <a:endParaRPr b="0" lang="en-US" sz="8910" spc="-1" strike="noStrike">
-              <a:solidFill>
-                <a:srgbClr val="000000"/>
-              </a:solidFill>
-              <a:latin typeface="Calibri"/>
+            <a:endParaRPr b="0" lang="en-GB" sz="3200" spc="-1" strike="noStrike">
+              <a:latin typeface="Arial"/>
             </a:endParaRPr>
           </a:p>
         </p:txBody>
@@ -861,7 +741,7 @@
         </p:nvSpPr>
         <p:spPr>
           <a:xfrm>
-            <a:off x="11338200" y="22093560"/>
+            <a:off x="11338560" y="22093920"/>
             <a:ext cx="9274320" cy="11383560"/>
           </a:xfrm>
           <a:prstGeom prst="rect">
@@ -877,20 +757,8 @@
             <a:normAutofit/>
           </a:bodyPr>
           <a:p>
-            <a:pPr>
-              <a:lnSpc>
-                <a:spcPct val="90000"/>
-              </a:lnSpc>
-              <a:spcBef>
-                <a:spcPts val="1361"/>
-              </a:spcBef>
-              <a:buNone/>
-            </a:pPr>
-            <a:endParaRPr b="0" lang="en-US" sz="8910" spc="-1" strike="noStrike">
-              <a:solidFill>
-                <a:srgbClr val="000000"/>
-              </a:solidFill>
-              <a:latin typeface="Calibri"/>
+            <a:endParaRPr b="0" lang="en-GB" sz="3200" spc="-1" strike="noStrike">
+              <a:latin typeface="Arial"/>
             </a:endParaRPr>
           </a:p>
         </p:txBody>
@@ -907,7 +775,7 @@
         </p:nvSpPr>
         <p:spPr>
           <a:xfrm>
-            <a:off x="21076560" y="22093560"/>
+            <a:off x="21076920" y="22093920"/>
             <a:ext cx="9274320" cy="11383560"/>
           </a:xfrm>
           <a:prstGeom prst="rect">
@@ -923,20 +791,8 @@
             <a:normAutofit/>
           </a:bodyPr>
           <a:p>
-            <a:pPr>
-              <a:lnSpc>
-                <a:spcPct val="90000"/>
-              </a:lnSpc>
-              <a:spcBef>
-                <a:spcPts val="1361"/>
-              </a:spcBef>
-              <a:buNone/>
-            </a:pPr>
-            <a:endParaRPr b="0" lang="en-US" sz="8910" spc="-1" strike="noStrike">
-              <a:solidFill>
-                <a:srgbClr val="000000"/>
-              </a:solidFill>
-              <a:latin typeface="Calibri"/>
+            <a:endParaRPr b="0" lang="en-GB" sz="3200" spc="-1" strike="noStrike">
+              <a:latin typeface="Arial"/>
             </a:endParaRPr>
           </a:p>
         </p:txBody>
@@ -948,7 +804,7 @@
             <a:spLocks noGrp="1"/>
           </p:cNvSpPr>
           <p:nvPr>
-            <p:ph type="ftr" idx="2"/>
+            <p:ph type="ftr" idx="1"/>
           </p:nvPr>
         </p:nvSpPr>
         <p:spPr/>
@@ -968,14 +824,14 @@
             <a:spLocks noGrp="1"/>
           </p:cNvSpPr>
           <p:nvPr>
-            <p:ph type="sldNum" idx="3"/>
+            <p:ph type="sldNum" idx="2"/>
           </p:nvPr>
         </p:nvSpPr>
         <p:spPr/>
         <p:txBody>
           <a:bodyPr/>
           <a:p>
-            <a:fld id="{27D03FC1-748B-41EF-A726-068751FBA9A9}" type="slidenum">
+            <a:fld id="{24365352-74D0-4C01-B9DE-2CA5B358903A}" type="slidenum">
               <a:t>&lt;#&gt;</a:t>
             </a:fld>
           </a:p>
@@ -988,7 +844,7 @@
             <a:spLocks noGrp="1"/>
           </p:cNvSpPr>
           <p:nvPr>
-            <p:ph type="dt" idx="1"/>
+            <p:ph type="dt" idx="3"/>
           </p:nvPr>
         </p:nvSpPr>
         <p:spPr/>
@@ -1037,7 +893,7 @@
         <p:spPr>
           <a:xfrm>
             <a:off x="2400120" y="6734160"/>
-            <a:ext cx="27203040" cy="14325480"/>
+            <a:ext cx="27202320" cy="14324760"/>
           </a:xfrm>
           <a:prstGeom prst="rect">
             <a:avLst/>
@@ -1052,11 +908,11 @@
             <a:noAutofit/>
           </a:bodyPr>
           <a:p>
-            <a:endParaRPr b="0" lang="en-US" sz="1729" spc="-1" strike="noStrike">
-              <a:solidFill>
-                <a:srgbClr val="000000"/>
-              </a:solidFill>
-              <a:latin typeface="Calibri"/>
+            <a:pPr algn="ctr">
+              <a:buNone/>
+            </a:pPr>
+            <a:endParaRPr b="0" lang="en-GB" sz="4400" spc="-1" strike="noStrike">
+              <a:latin typeface="Arial"/>
             </a:endParaRPr>
           </a:p>
         </p:txBody>
@@ -1073,8 +929,8 @@
         </p:nvSpPr>
         <p:spPr>
           <a:xfrm>
-            <a:off x="1599840" y="9628200"/>
-            <a:ext cx="28803240" cy="23865480"/>
+            <a:off x="1600200" y="9628560"/>
+            <a:ext cx="28802880" cy="23865120"/>
           </a:xfrm>
           <a:prstGeom prst="rect">
             <a:avLst/>
@@ -1105,7 +961,7 @@
             <a:spLocks noGrp="1"/>
           </p:cNvSpPr>
           <p:nvPr>
-            <p:ph type="ftr" idx="2"/>
+            <p:ph type="ftr" idx="1"/>
           </p:nvPr>
         </p:nvSpPr>
         <p:spPr/>
@@ -1125,14 +981,14 @@
             <a:spLocks noGrp="1"/>
           </p:cNvSpPr>
           <p:nvPr>
-            <p:ph type="sldNum" idx="3"/>
+            <p:ph type="sldNum" idx="2"/>
           </p:nvPr>
         </p:nvSpPr>
         <p:spPr/>
         <p:txBody>
           <a:bodyPr/>
           <a:p>
-            <a:fld id="{85601AA3-D1A5-421E-87EA-0CF9D2F86744}" type="slidenum">
+            <a:fld id="{ED4C9540-7AAE-4692-B6AD-8206D5726386}" type="slidenum">
               <a:t>&lt;#&gt;</a:t>
             </a:fld>
           </a:p>
@@ -1145,7 +1001,7 @@
             <a:spLocks noGrp="1"/>
           </p:cNvSpPr>
           <p:nvPr>
-            <p:ph type="dt" idx="1"/>
+            <p:ph type="dt" idx="3"/>
           </p:nvPr>
         </p:nvSpPr>
         <p:spPr/>
@@ -1194,7 +1050,7 @@
         <p:spPr>
           <a:xfrm>
             <a:off x="2400120" y="6734160"/>
-            <a:ext cx="27203040" cy="14325480"/>
+            <a:ext cx="27202320" cy="14324760"/>
           </a:xfrm>
           <a:prstGeom prst="rect">
             <a:avLst/>
@@ -1209,11 +1065,11 @@
             <a:noAutofit/>
           </a:bodyPr>
           <a:p>
-            <a:endParaRPr b="0" lang="en-US" sz="1729" spc="-1" strike="noStrike">
-              <a:solidFill>
-                <a:srgbClr val="000000"/>
-              </a:solidFill>
-              <a:latin typeface="Calibri"/>
+            <a:pPr algn="ctr">
+              <a:buNone/>
+            </a:pPr>
+            <a:endParaRPr b="0" lang="en-GB" sz="4400" spc="-1" strike="noStrike">
+              <a:latin typeface="Arial"/>
             </a:endParaRPr>
           </a:p>
         </p:txBody>
@@ -1230,8 +1086,8 @@
         </p:nvSpPr>
         <p:spPr>
           <a:xfrm>
-            <a:off x="1599840" y="9628200"/>
-            <a:ext cx="28803240" cy="23865480"/>
+            <a:off x="1600200" y="9628560"/>
+            <a:ext cx="28802880" cy="23865120"/>
           </a:xfrm>
           <a:prstGeom prst="rect">
             <a:avLst/>
@@ -1246,20 +1102,8 @@
             <a:normAutofit/>
           </a:bodyPr>
           <a:p>
-            <a:pPr>
-              <a:lnSpc>
-                <a:spcPct val="90000"/>
-              </a:lnSpc>
-              <a:spcBef>
-                <a:spcPts val="1361"/>
-              </a:spcBef>
-              <a:buNone/>
-            </a:pPr>
-            <a:endParaRPr b="0" lang="en-US" sz="8910" spc="-1" strike="noStrike">
-              <a:solidFill>
-                <a:srgbClr val="000000"/>
-              </a:solidFill>
-              <a:latin typeface="Calibri"/>
+            <a:endParaRPr b="0" lang="en-GB" sz="3200" spc="-1" strike="noStrike">
+              <a:latin typeface="Arial"/>
             </a:endParaRPr>
           </a:p>
         </p:txBody>
@@ -1271,7 +1115,7 @@
             <a:spLocks noGrp="1"/>
           </p:cNvSpPr>
           <p:nvPr>
-            <p:ph type="ftr" idx="2"/>
+            <p:ph type="ftr" idx="1"/>
           </p:nvPr>
         </p:nvSpPr>
         <p:spPr/>
@@ -1291,14 +1135,14 @@
             <a:spLocks noGrp="1"/>
           </p:cNvSpPr>
           <p:nvPr>
-            <p:ph type="sldNum" idx="3"/>
+            <p:ph type="sldNum" idx="2"/>
           </p:nvPr>
         </p:nvSpPr>
         <p:spPr/>
         <p:txBody>
           <a:bodyPr/>
           <a:p>
-            <a:fld id="{40B41DB1-5196-4F74-A58A-AEBC5FD576E6}" type="slidenum">
+            <a:fld id="{2BB1A721-0363-4521-95F9-54BD7BD75237}" type="slidenum">
               <a:t>&lt;#&gt;</a:t>
             </a:fld>
           </a:p>
@@ -1311,7 +1155,7 @@
             <a:spLocks noGrp="1"/>
           </p:cNvSpPr>
           <p:nvPr>
-            <p:ph type="dt" idx="1"/>
+            <p:ph type="dt" idx="3"/>
           </p:nvPr>
         </p:nvSpPr>
         <p:spPr/>
@@ -1360,7 +1204,7 @@
         <p:spPr>
           <a:xfrm>
             <a:off x="2400120" y="6734160"/>
-            <a:ext cx="27203040" cy="14325480"/>
+            <a:ext cx="27202320" cy="14324760"/>
           </a:xfrm>
           <a:prstGeom prst="rect">
             <a:avLst/>
@@ -1375,11 +1219,11 @@
             <a:noAutofit/>
           </a:bodyPr>
           <a:p>
-            <a:endParaRPr b="0" lang="en-US" sz="1729" spc="-1" strike="noStrike">
-              <a:solidFill>
-                <a:srgbClr val="000000"/>
-              </a:solidFill>
-              <a:latin typeface="Calibri"/>
+            <a:pPr algn="ctr">
+              <a:buNone/>
+            </a:pPr>
+            <a:endParaRPr b="0" lang="en-GB" sz="4400" spc="-1" strike="noStrike">
+              <a:latin typeface="Arial"/>
             </a:endParaRPr>
           </a:p>
         </p:txBody>
@@ -1396,8 +1240,8 @@
         </p:nvSpPr>
         <p:spPr>
           <a:xfrm>
-            <a:off x="1599840" y="9628200"/>
-            <a:ext cx="14055840" cy="23865480"/>
+            <a:off x="1600200" y="9628560"/>
+            <a:ext cx="14055480" cy="23865120"/>
           </a:xfrm>
           <a:prstGeom prst="rect">
             <a:avLst/>
@@ -1412,20 +1256,8 @@
             <a:normAutofit/>
           </a:bodyPr>
           <a:p>
-            <a:pPr>
-              <a:lnSpc>
-                <a:spcPct val="90000"/>
-              </a:lnSpc>
-              <a:spcBef>
-                <a:spcPts val="1361"/>
-              </a:spcBef>
-              <a:buNone/>
-            </a:pPr>
-            <a:endParaRPr b="0" lang="en-US" sz="8910" spc="-1" strike="noStrike">
-              <a:solidFill>
-                <a:srgbClr val="000000"/>
-              </a:solidFill>
-              <a:latin typeface="Calibri"/>
+            <a:endParaRPr b="0" lang="en-GB" sz="3200" spc="-1" strike="noStrike">
+              <a:latin typeface="Arial"/>
             </a:endParaRPr>
           </a:p>
         </p:txBody>
@@ -1442,8 +1274,8 @@
         </p:nvSpPr>
         <p:spPr>
           <a:xfrm>
-            <a:off x="16358760" y="9628200"/>
-            <a:ext cx="14055840" cy="23865480"/>
+            <a:off x="16358760" y="9628560"/>
+            <a:ext cx="14055480" cy="23865120"/>
           </a:xfrm>
           <a:prstGeom prst="rect">
             <a:avLst/>
@@ -1458,20 +1290,8 @@
             <a:normAutofit/>
           </a:bodyPr>
           <a:p>
-            <a:pPr>
-              <a:lnSpc>
-                <a:spcPct val="90000"/>
-              </a:lnSpc>
-              <a:spcBef>
-                <a:spcPts val="1361"/>
-              </a:spcBef>
-              <a:buNone/>
-            </a:pPr>
-            <a:endParaRPr b="0" lang="en-US" sz="8910" spc="-1" strike="noStrike">
-              <a:solidFill>
-                <a:srgbClr val="000000"/>
-              </a:solidFill>
-              <a:latin typeface="Calibri"/>
+            <a:endParaRPr b="0" lang="en-GB" sz="3200" spc="-1" strike="noStrike">
+              <a:latin typeface="Arial"/>
             </a:endParaRPr>
           </a:p>
         </p:txBody>
@@ -1483,7 +1303,7 @@
             <a:spLocks noGrp="1"/>
           </p:cNvSpPr>
           <p:nvPr>
-            <p:ph type="ftr" idx="2"/>
+            <p:ph type="ftr" idx="1"/>
           </p:nvPr>
         </p:nvSpPr>
         <p:spPr/>
@@ -1503,14 +1323,14 @@
             <a:spLocks noGrp="1"/>
           </p:cNvSpPr>
           <p:nvPr>
-            <p:ph type="sldNum" idx="3"/>
+            <p:ph type="sldNum" idx="2"/>
           </p:nvPr>
         </p:nvSpPr>
         <p:spPr/>
         <p:txBody>
           <a:bodyPr/>
           <a:p>
-            <a:fld id="{5B86F38A-B313-4641-9BC8-AB9A33ED16FB}" type="slidenum">
+            <a:fld id="{3AF298FC-699F-4E3C-820E-0A27BBE9BEA9}" type="slidenum">
               <a:t>&lt;#&gt;</a:t>
             </a:fld>
           </a:p>
@@ -1523,7 +1343,7 @@
             <a:spLocks noGrp="1"/>
           </p:cNvSpPr>
           <p:nvPr>
-            <p:ph type="dt" idx="1"/>
+            <p:ph type="dt" idx="3"/>
           </p:nvPr>
         </p:nvSpPr>
         <p:spPr/>
@@ -1572,7 +1392,7 @@
         <p:spPr>
           <a:xfrm>
             <a:off x="2400120" y="6734160"/>
-            <a:ext cx="27203040" cy="14325480"/>
+            <a:ext cx="27202320" cy="14324760"/>
           </a:xfrm>
           <a:prstGeom prst="rect">
             <a:avLst/>
@@ -1587,11 +1407,11 @@
             <a:noAutofit/>
           </a:bodyPr>
           <a:p>
-            <a:endParaRPr b="0" lang="en-US" sz="1729" spc="-1" strike="noStrike">
-              <a:solidFill>
-                <a:srgbClr val="000000"/>
-              </a:solidFill>
-              <a:latin typeface="Calibri"/>
+            <a:pPr algn="ctr">
+              <a:buNone/>
+            </a:pPr>
+            <a:endParaRPr b="0" lang="en-GB" sz="4400" spc="-1" strike="noStrike">
+              <a:latin typeface="Arial"/>
             </a:endParaRPr>
           </a:p>
         </p:txBody>
@@ -1603,7 +1423,7 @@
             <a:spLocks noGrp="1"/>
           </p:cNvSpPr>
           <p:nvPr>
-            <p:ph type="ftr" idx="2"/>
+            <p:ph type="ftr" idx="1"/>
           </p:nvPr>
         </p:nvSpPr>
         <p:spPr/>
@@ -1623,14 +1443,14 @@
             <a:spLocks noGrp="1"/>
           </p:cNvSpPr>
           <p:nvPr>
-            <p:ph type="sldNum" idx="3"/>
+            <p:ph type="sldNum" idx="2"/>
           </p:nvPr>
         </p:nvSpPr>
         <p:spPr/>
         <p:txBody>
           <a:bodyPr/>
           <a:p>
-            <a:fld id="{2945F233-6970-4BE7-9DB8-86AFD8367A3F}" type="slidenum">
+            <a:fld id="{29213140-8741-447F-9AB6-920BEBA2CF97}" type="slidenum">
               <a:t>&lt;#&gt;</a:t>
             </a:fld>
           </a:p>
@@ -1643,7 +1463,7 @@
             <a:spLocks noGrp="1"/>
           </p:cNvSpPr>
           <p:nvPr>
-            <p:ph type="dt" idx="1"/>
+            <p:ph type="dt" idx="3"/>
           </p:nvPr>
         </p:nvSpPr>
         <p:spPr/>
@@ -1692,7 +1512,7 @@
         <p:spPr>
           <a:xfrm>
             <a:off x="2400120" y="6734160"/>
-            <a:ext cx="27203040" cy="66405600"/>
+            <a:ext cx="27202320" cy="66402360"/>
           </a:xfrm>
           <a:prstGeom prst="rect">
             <a:avLst/>
@@ -1723,7 +1543,7 @@
             <a:spLocks noGrp="1"/>
           </p:cNvSpPr>
           <p:nvPr>
-            <p:ph type="ftr" idx="2"/>
+            <p:ph type="ftr" idx="1"/>
           </p:nvPr>
         </p:nvSpPr>
         <p:spPr/>
@@ -1743,14 +1563,14 @@
             <a:spLocks noGrp="1"/>
           </p:cNvSpPr>
           <p:nvPr>
-            <p:ph type="sldNum" idx="3"/>
+            <p:ph type="sldNum" idx="2"/>
           </p:nvPr>
         </p:nvSpPr>
         <p:spPr/>
         <p:txBody>
           <a:bodyPr/>
           <a:p>
-            <a:fld id="{F0CAE9C4-D250-4FE3-80A6-02DA833E0C76}" type="slidenum">
+            <a:fld id="{D94E66F9-8153-4D53-96D8-B0B12409CDE6}" type="slidenum">
               <a:t>&lt;#&gt;</a:t>
             </a:fld>
           </a:p>
@@ -1763,7 +1583,7 @@
             <a:spLocks noGrp="1"/>
           </p:cNvSpPr>
           <p:nvPr>
-            <p:ph type="dt" idx="1"/>
+            <p:ph type="dt" idx="3"/>
           </p:nvPr>
         </p:nvSpPr>
         <p:spPr/>
@@ -1812,7 +1632,7 @@
         <p:spPr>
           <a:xfrm>
             <a:off x="2400120" y="6734160"/>
-            <a:ext cx="27203040" cy="14325480"/>
+            <a:ext cx="27202320" cy="14324760"/>
           </a:xfrm>
           <a:prstGeom prst="rect">
             <a:avLst/>
@@ -1827,11 +1647,11 @@
             <a:noAutofit/>
           </a:bodyPr>
           <a:p>
-            <a:endParaRPr b="0" lang="en-US" sz="1729" spc="-1" strike="noStrike">
-              <a:solidFill>
-                <a:srgbClr val="000000"/>
-              </a:solidFill>
-              <a:latin typeface="Calibri"/>
+            <a:pPr algn="ctr">
+              <a:buNone/>
+            </a:pPr>
+            <a:endParaRPr b="0" lang="en-GB" sz="4400" spc="-1" strike="noStrike">
+              <a:latin typeface="Arial"/>
             </a:endParaRPr>
           </a:p>
         </p:txBody>
@@ -1848,8 +1668,8 @@
         </p:nvSpPr>
         <p:spPr>
           <a:xfrm>
-            <a:off x="1599840" y="9628200"/>
-            <a:ext cx="14055840" cy="11383560"/>
+            <a:off x="1600200" y="9628560"/>
+            <a:ext cx="14055480" cy="11383560"/>
           </a:xfrm>
           <a:prstGeom prst="rect">
             <a:avLst/>
@@ -1864,20 +1684,8 @@
             <a:normAutofit/>
           </a:bodyPr>
           <a:p>
-            <a:pPr>
-              <a:lnSpc>
-                <a:spcPct val="90000"/>
-              </a:lnSpc>
-              <a:spcBef>
-                <a:spcPts val="1361"/>
-              </a:spcBef>
-              <a:buNone/>
-            </a:pPr>
-            <a:endParaRPr b="0" lang="en-US" sz="8910" spc="-1" strike="noStrike">
-              <a:solidFill>
-                <a:srgbClr val="000000"/>
-              </a:solidFill>
-              <a:latin typeface="Calibri"/>
+            <a:endParaRPr b="0" lang="en-GB" sz="3200" spc="-1" strike="noStrike">
+              <a:latin typeface="Arial"/>
             </a:endParaRPr>
           </a:p>
         </p:txBody>
@@ -1894,8 +1702,8 @@
         </p:nvSpPr>
         <p:spPr>
           <a:xfrm>
-            <a:off x="16358760" y="9628200"/>
-            <a:ext cx="14055840" cy="23865480"/>
+            <a:off x="16358760" y="9628560"/>
+            <a:ext cx="14055480" cy="23865120"/>
           </a:xfrm>
           <a:prstGeom prst="rect">
             <a:avLst/>
@@ -1910,20 +1718,8 @@
             <a:normAutofit/>
           </a:bodyPr>
           <a:p>
-            <a:pPr>
-              <a:lnSpc>
-                <a:spcPct val="90000"/>
-              </a:lnSpc>
-              <a:spcBef>
-                <a:spcPts val="1361"/>
-              </a:spcBef>
-              <a:buNone/>
-            </a:pPr>
-            <a:endParaRPr b="0" lang="en-US" sz="8910" spc="-1" strike="noStrike">
-              <a:solidFill>
-                <a:srgbClr val="000000"/>
-              </a:solidFill>
-              <a:latin typeface="Calibri"/>
+            <a:endParaRPr b="0" lang="en-GB" sz="3200" spc="-1" strike="noStrike">
+              <a:latin typeface="Arial"/>
             </a:endParaRPr>
           </a:p>
         </p:txBody>
@@ -1940,8 +1736,8 @@
         </p:nvSpPr>
         <p:spPr>
           <a:xfrm>
-            <a:off x="1599840" y="22093560"/>
-            <a:ext cx="14055840" cy="11383560"/>
+            <a:off x="1600200" y="22093920"/>
+            <a:ext cx="14055480" cy="11383560"/>
           </a:xfrm>
           <a:prstGeom prst="rect">
             <a:avLst/>
@@ -1956,20 +1752,8 @@
             <a:normAutofit/>
           </a:bodyPr>
           <a:p>
-            <a:pPr>
-              <a:lnSpc>
-                <a:spcPct val="90000"/>
-              </a:lnSpc>
-              <a:spcBef>
-                <a:spcPts val="1361"/>
-              </a:spcBef>
-              <a:buNone/>
-            </a:pPr>
-            <a:endParaRPr b="0" lang="en-US" sz="8910" spc="-1" strike="noStrike">
-              <a:solidFill>
-                <a:srgbClr val="000000"/>
-              </a:solidFill>
-              <a:latin typeface="Calibri"/>
+            <a:endParaRPr b="0" lang="en-GB" sz="3200" spc="-1" strike="noStrike">
+              <a:latin typeface="Arial"/>
             </a:endParaRPr>
           </a:p>
         </p:txBody>
@@ -1981,7 +1765,7 @@
             <a:spLocks noGrp="1"/>
           </p:cNvSpPr>
           <p:nvPr>
-            <p:ph type="ftr" idx="2"/>
+            <p:ph type="ftr" idx="1"/>
           </p:nvPr>
         </p:nvSpPr>
         <p:spPr/>
@@ -2001,14 +1785,14 @@
             <a:spLocks noGrp="1"/>
           </p:cNvSpPr>
           <p:nvPr>
-            <p:ph type="sldNum" idx="3"/>
+            <p:ph type="sldNum" idx="2"/>
           </p:nvPr>
         </p:nvSpPr>
         <p:spPr/>
         <p:txBody>
           <a:bodyPr/>
           <a:p>
-            <a:fld id="{9FEF5AFB-2E60-4689-9243-6D094C60ECB9}" type="slidenum">
+            <a:fld id="{17BDAABB-8907-47D7-BBE6-4D63F0B72B15}" type="slidenum">
               <a:t>&lt;#&gt;</a:t>
             </a:fld>
           </a:p>
@@ -2021,7 +1805,7 @@
             <a:spLocks noGrp="1"/>
           </p:cNvSpPr>
           <p:nvPr>
-            <p:ph type="dt" idx="1"/>
+            <p:ph type="dt" idx="3"/>
           </p:nvPr>
         </p:nvSpPr>
         <p:spPr/>
@@ -2070,7 +1854,7 @@
         <p:spPr>
           <a:xfrm>
             <a:off x="2400120" y="6734160"/>
-            <a:ext cx="27203040" cy="14325480"/>
+            <a:ext cx="27202320" cy="14324760"/>
           </a:xfrm>
           <a:prstGeom prst="rect">
             <a:avLst/>
@@ -2085,11 +1869,11 @@
             <a:noAutofit/>
           </a:bodyPr>
           <a:p>
-            <a:endParaRPr b="0" lang="en-US" sz="1729" spc="-1" strike="noStrike">
-              <a:solidFill>
-                <a:srgbClr val="000000"/>
-              </a:solidFill>
-              <a:latin typeface="Calibri"/>
+            <a:pPr algn="ctr">
+              <a:buNone/>
+            </a:pPr>
+            <a:endParaRPr b="0" lang="en-GB" sz="4400" spc="-1" strike="noStrike">
+              <a:latin typeface="Arial"/>
             </a:endParaRPr>
           </a:p>
         </p:txBody>
@@ -2106,8 +1890,8 @@
         </p:nvSpPr>
         <p:spPr>
           <a:xfrm>
-            <a:off x="1599840" y="9628200"/>
-            <a:ext cx="14055840" cy="23865480"/>
+            <a:off x="1600200" y="9628560"/>
+            <a:ext cx="14055480" cy="23865120"/>
           </a:xfrm>
           <a:prstGeom prst="rect">
             <a:avLst/>
@@ -2122,20 +1906,8 @@
             <a:normAutofit/>
           </a:bodyPr>
           <a:p>
-            <a:pPr>
-              <a:lnSpc>
-                <a:spcPct val="90000"/>
-              </a:lnSpc>
-              <a:spcBef>
-                <a:spcPts val="1361"/>
-              </a:spcBef>
-              <a:buNone/>
-            </a:pPr>
-            <a:endParaRPr b="0" lang="en-US" sz="8910" spc="-1" strike="noStrike">
-              <a:solidFill>
-                <a:srgbClr val="000000"/>
-              </a:solidFill>
-              <a:latin typeface="Calibri"/>
+            <a:endParaRPr b="0" lang="en-GB" sz="3200" spc="-1" strike="noStrike">
+              <a:latin typeface="Arial"/>
             </a:endParaRPr>
           </a:p>
         </p:txBody>
@@ -2152,8 +1924,8 @@
         </p:nvSpPr>
         <p:spPr>
           <a:xfrm>
-            <a:off x="16358760" y="9628200"/>
-            <a:ext cx="14055840" cy="11383560"/>
+            <a:off x="16358760" y="9628560"/>
+            <a:ext cx="14055480" cy="11383560"/>
           </a:xfrm>
           <a:prstGeom prst="rect">
             <a:avLst/>
@@ -2168,20 +1940,8 @@
             <a:normAutofit/>
           </a:bodyPr>
           <a:p>
-            <a:pPr>
-              <a:lnSpc>
-                <a:spcPct val="90000"/>
-              </a:lnSpc>
-              <a:spcBef>
-                <a:spcPts val="1361"/>
-              </a:spcBef>
-              <a:buNone/>
-            </a:pPr>
-            <a:endParaRPr b="0" lang="en-US" sz="8910" spc="-1" strike="noStrike">
-              <a:solidFill>
-                <a:srgbClr val="000000"/>
-              </a:solidFill>
-              <a:latin typeface="Calibri"/>
+            <a:endParaRPr b="0" lang="en-GB" sz="3200" spc="-1" strike="noStrike">
+              <a:latin typeface="Arial"/>
             </a:endParaRPr>
           </a:p>
         </p:txBody>
@@ -2198,8 +1958,8 @@
         </p:nvSpPr>
         <p:spPr>
           <a:xfrm>
-            <a:off x="16358760" y="22093560"/>
-            <a:ext cx="14055840" cy="11383560"/>
+            <a:off x="16358760" y="22093920"/>
+            <a:ext cx="14055480" cy="11383560"/>
           </a:xfrm>
           <a:prstGeom prst="rect">
             <a:avLst/>
@@ -2214,20 +1974,8 @@
             <a:normAutofit/>
           </a:bodyPr>
           <a:p>
-            <a:pPr>
-              <a:lnSpc>
-                <a:spcPct val="90000"/>
-              </a:lnSpc>
-              <a:spcBef>
-                <a:spcPts val="1361"/>
-              </a:spcBef>
-              <a:buNone/>
-            </a:pPr>
-            <a:endParaRPr b="0" lang="en-US" sz="8910" spc="-1" strike="noStrike">
-              <a:solidFill>
-                <a:srgbClr val="000000"/>
-              </a:solidFill>
-              <a:latin typeface="Calibri"/>
+            <a:endParaRPr b="0" lang="en-GB" sz="3200" spc="-1" strike="noStrike">
+              <a:latin typeface="Arial"/>
             </a:endParaRPr>
           </a:p>
         </p:txBody>
@@ -2239,7 +1987,7 @@
             <a:spLocks noGrp="1"/>
           </p:cNvSpPr>
           <p:nvPr>
-            <p:ph type="ftr" idx="2"/>
+            <p:ph type="ftr" idx="1"/>
           </p:nvPr>
         </p:nvSpPr>
         <p:spPr/>
@@ -2259,14 +2007,14 @@
             <a:spLocks noGrp="1"/>
           </p:cNvSpPr>
           <p:nvPr>
-            <p:ph type="sldNum" idx="3"/>
+            <p:ph type="sldNum" idx="2"/>
           </p:nvPr>
         </p:nvSpPr>
         <p:spPr/>
         <p:txBody>
           <a:bodyPr/>
           <a:p>
-            <a:fld id="{06DAC5E8-8E82-4435-9863-D69EFB1EBE6A}" type="slidenum">
+            <a:fld id="{C83F68E6-454B-46A1-B0F4-85B17B0CEBF2}" type="slidenum">
               <a:t>&lt;#&gt;</a:t>
             </a:fld>
           </a:p>
@@ -2279,7 +2027,7 @@
             <a:spLocks noGrp="1"/>
           </p:cNvSpPr>
           <p:nvPr>
-            <p:ph type="dt" idx="1"/>
+            <p:ph type="dt" idx="3"/>
           </p:nvPr>
         </p:nvSpPr>
         <p:spPr/>
@@ -2328,7 +2076,7 @@
         <p:spPr>
           <a:xfrm>
             <a:off x="2400120" y="6734160"/>
-            <a:ext cx="27203040" cy="14325480"/>
+            <a:ext cx="27202320" cy="14324760"/>
           </a:xfrm>
           <a:prstGeom prst="rect">
             <a:avLst/>
@@ -2343,11 +2091,11 @@
             <a:noAutofit/>
           </a:bodyPr>
           <a:p>
-            <a:endParaRPr b="0" lang="en-US" sz="1729" spc="-1" strike="noStrike">
-              <a:solidFill>
-                <a:srgbClr val="000000"/>
-              </a:solidFill>
-              <a:latin typeface="Calibri"/>
+            <a:pPr algn="ctr">
+              <a:buNone/>
+            </a:pPr>
+            <a:endParaRPr b="0" lang="en-GB" sz="4400" spc="-1" strike="noStrike">
+              <a:latin typeface="Arial"/>
             </a:endParaRPr>
           </a:p>
         </p:txBody>
@@ -2364,8 +2112,8 @@
         </p:nvSpPr>
         <p:spPr>
           <a:xfrm>
-            <a:off x="1599840" y="9628200"/>
-            <a:ext cx="14055840" cy="11383560"/>
+            <a:off x="1600200" y="9628560"/>
+            <a:ext cx="14055480" cy="11383560"/>
           </a:xfrm>
           <a:prstGeom prst="rect">
             <a:avLst/>
@@ -2380,20 +2128,8 @@
             <a:normAutofit/>
           </a:bodyPr>
           <a:p>
-            <a:pPr>
-              <a:lnSpc>
-                <a:spcPct val="90000"/>
-              </a:lnSpc>
-              <a:spcBef>
-                <a:spcPts val="1361"/>
-              </a:spcBef>
-              <a:buNone/>
-            </a:pPr>
-            <a:endParaRPr b="0" lang="en-US" sz="8910" spc="-1" strike="noStrike">
-              <a:solidFill>
-                <a:srgbClr val="000000"/>
-              </a:solidFill>
-              <a:latin typeface="Calibri"/>
+            <a:endParaRPr b="0" lang="en-GB" sz="3200" spc="-1" strike="noStrike">
+              <a:latin typeface="Arial"/>
             </a:endParaRPr>
           </a:p>
         </p:txBody>
@@ -2410,8 +2146,8 @@
         </p:nvSpPr>
         <p:spPr>
           <a:xfrm>
-            <a:off x="16358760" y="9628200"/>
-            <a:ext cx="14055840" cy="11383560"/>
+            <a:off x="16358760" y="9628560"/>
+            <a:ext cx="14055480" cy="11383560"/>
           </a:xfrm>
           <a:prstGeom prst="rect">
             <a:avLst/>
@@ -2426,20 +2162,8 @@
             <a:normAutofit/>
           </a:bodyPr>
           <a:p>
-            <a:pPr>
-              <a:lnSpc>
-                <a:spcPct val="90000"/>
-              </a:lnSpc>
-              <a:spcBef>
-                <a:spcPts val="1361"/>
-              </a:spcBef>
-              <a:buNone/>
-            </a:pPr>
-            <a:endParaRPr b="0" lang="en-US" sz="8910" spc="-1" strike="noStrike">
-              <a:solidFill>
-                <a:srgbClr val="000000"/>
-              </a:solidFill>
-              <a:latin typeface="Calibri"/>
+            <a:endParaRPr b="0" lang="en-GB" sz="3200" spc="-1" strike="noStrike">
+              <a:latin typeface="Arial"/>
             </a:endParaRPr>
           </a:p>
         </p:txBody>
@@ -2456,8 +2180,8 @@
         </p:nvSpPr>
         <p:spPr>
           <a:xfrm>
-            <a:off x="1599840" y="22093560"/>
-            <a:ext cx="28803240" cy="11383560"/>
+            <a:off x="1600200" y="22093920"/>
+            <a:ext cx="28802880" cy="11383560"/>
           </a:xfrm>
           <a:prstGeom prst="rect">
             <a:avLst/>
@@ -2472,20 +2196,8 @@
             <a:normAutofit/>
           </a:bodyPr>
           <a:p>
-            <a:pPr>
-              <a:lnSpc>
-                <a:spcPct val="90000"/>
-              </a:lnSpc>
-              <a:spcBef>
-                <a:spcPts val="1361"/>
-              </a:spcBef>
-              <a:buNone/>
-            </a:pPr>
-            <a:endParaRPr b="0" lang="en-US" sz="8910" spc="-1" strike="noStrike">
-              <a:solidFill>
-                <a:srgbClr val="000000"/>
-              </a:solidFill>
-              <a:latin typeface="Calibri"/>
+            <a:endParaRPr b="0" lang="en-GB" sz="3200" spc="-1" strike="noStrike">
+              <a:latin typeface="Arial"/>
             </a:endParaRPr>
           </a:p>
         </p:txBody>
@@ -2497,7 +2209,7 @@
             <a:spLocks noGrp="1"/>
           </p:cNvSpPr>
           <p:nvPr>
-            <p:ph type="ftr" idx="2"/>
+            <p:ph type="ftr" idx="1"/>
           </p:nvPr>
         </p:nvSpPr>
         <p:spPr/>
@@ -2517,14 +2229,14 @@
             <a:spLocks noGrp="1"/>
           </p:cNvSpPr>
           <p:nvPr>
-            <p:ph type="sldNum" idx="3"/>
+            <p:ph type="sldNum" idx="2"/>
           </p:nvPr>
         </p:nvSpPr>
         <p:spPr/>
         <p:txBody>
           <a:bodyPr/>
           <a:p>
-            <a:fld id="{1A7F5EC7-571D-4875-9670-6D5E0BBF8A9C}" type="slidenum">
+            <a:fld id="{04DAC3A2-A55C-4F35-9D15-4D30CCA88D18}" type="slidenum">
               <a:t>&lt;#&gt;</a:t>
             </a:fld>
           </a:p>
@@ -2537,7 +2249,7 @@
             <a:spLocks noGrp="1"/>
           </p:cNvSpPr>
           <p:nvPr>
-            <p:ph type="dt" idx="1"/>
+            <p:ph type="dt" idx="3"/>
           </p:nvPr>
         </p:nvSpPr>
         <p:spPr/>
@@ -2593,7 +2305,7 @@
         <p:spPr>
           <a:xfrm>
             <a:off x="2400120" y="6734160"/>
-            <a:ext cx="27203040" cy="14325480"/>
+            <a:ext cx="27202320" cy="14324760"/>
           </a:xfrm>
           <a:prstGeom prst="rect">
             <a:avLst/>
@@ -2604,30 +2316,18 @@
           </a:ln>
         </p:spPr>
         <p:txBody>
-          <a:bodyPr anchor="b">
+          <a:bodyPr lIns="0" rIns="0" tIns="0" bIns="0" anchor="ctr">
             <a:noAutofit/>
           </a:bodyPr>
           <a:p>
-            <a:pPr algn="ctr">
-              <a:lnSpc>
-                <a:spcPct val="90000"/>
-              </a:lnSpc>
-              <a:buNone/>
-            </a:pPr>
             <a:r>
-              <a:rPr b="0" lang="en-US" sz="19870" spc="-1" strike="noStrike">
-                <a:solidFill>
-                  <a:srgbClr val="000000"/>
-                </a:solidFill>
-                <a:latin typeface="Calibri Light"/>
+              <a:rPr b="0" lang="en-GB" sz="1800" spc="-1" strike="noStrike">
+                <a:latin typeface="Arial"/>
               </a:rPr>
-              <a:t>Click to edit Master title style</a:t>
+              <a:t>Click to edit the title text format</a:t>
             </a:r>
-            <a:endParaRPr b="0" lang="en-US" sz="19870" spc="-1" strike="noStrike">
-              <a:solidFill>
-                <a:srgbClr val="000000"/>
-              </a:solidFill>
-              <a:latin typeface="Calibri"/>
+            <a:endParaRPr b="0" lang="en-GB" sz="1800" spc="-1" strike="noStrike">
+              <a:latin typeface="Arial"/>
             </a:endParaRPr>
           </a:p>
         </p:txBody>
@@ -2639,13 +2339,13 @@
             <a:spLocks noGrp="1"/>
           </p:cNvSpPr>
           <p:nvPr>
-            <p:ph type="dt" idx="1"/>
+            <p:ph type="body"/>
           </p:nvPr>
         </p:nvSpPr>
         <p:spPr>
           <a:xfrm>
-            <a:off x="2200320" y="38138040"/>
-            <a:ext cx="7200360" cy="2190240"/>
+            <a:off x="1600200" y="9628560"/>
+            <a:ext cx="28802880" cy="23865120"/>
           </a:xfrm>
           <a:prstGeom prst="rect">
             <a:avLst/>
@@ -2656,43 +2356,163 @@
           </a:ln>
         </p:spPr>
         <p:txBody>
-          <a:bodyPr anchor="ctr">
-            <a:noAutofit/>
+          <a:bodyPr lIns="0" rIns="0" tIns="0" bIns="0" anchor="t">
+            <a:normAutofit/>
           </a:bodyPr>
-          <a:lstStyle>
-            <a:lvl1pPr>
-              <a:lnSpc>
-                <a:spcPct val="100000"/>
-              </a:lnSpc>
-              <a:buNone/>
-              <a:defRPr b="0" lang="en-US" sz="3970" spc="-1" strike="noStrike">
-                <a:solidFill>
-                  <a:srgbClr val="8b8b8b"/>
-                </a:solidFill>
-                <a:latin typeface="Calibri"/>
-              </a:defRPr>
-            </a:lvl1pPr>
-          </a:lstStyle>
-          <a:p>
-            <a:pPr>
-              <a:lnSpc>
-                <a:spcPct val="100000"/>
-              </a:lnSpc>
-              <a:buNone/>
+          <a:p>
+            <a:pPr marL="432000" indent="-324000">
+              <a:spcBef>
+                <a:spcPts val="1417"/>
+              </a:spcBef>
+              <a:buClr>
+                <a:srgbClr val="000000"/>
+              </a:buClr>
+              <a:buSzPct val="45000"/>
+              <a:buFont typeface="Wingdings" charset="2"/>
+              <a:buChar char=""/>
             </a:pPr>
             <a:r>
-              <a:rPr b="0" lang="en-US" sz="3970" spc="-1" strike="noStrike">
-                <a:solidFill>
-                  <a:srgbClr val="8b8b8b"/>
-                </a:solidFill>
-                <a:latin typeface="Calibri"/>
+              <a:rPr b="0" lang="en-GB" sz="1800" spc="-1" strike="noStrike">
+                <a:latin typeface="Arial"/>
               </a:rPr>
-              <a:t>&lt;date/time&gt;</a:t>
+              <a:t>Click to edit the outline text format</a:t>
             </a:r>
-            <a:endParaRPr b="0" lang="en-GB" sz="3970" spc="-1" strike="noStrike">
-              <a:latin typeface="Times New Roman"/>
+            <a:endParaRPr b="0" lang="en-GB" sz="1800" spc="-1" strike="noStrike">
+              <a:latin typeface="Arial"/>
             </a:endParaRPr>
           </a:p>
+          <a:p>
+            <a:pPr lvl="1" marL="864000" indent="-324000">
+              <a:spcBef>
+                <a:spcPts val="1134"/>
+              </a:spcBef>
+              <a:buClr>
+                <a:srgbClr val="000000"/>
+              </a:buClr>
+              <a:buSzPct val="75000"/>
+              <a:buFont typeface="Symbol" charset="2"/>
+              <a:buChar char=""/>
+            </a:pPr>
+            <a:r>
+              <a:rPr b="0" lang="en-GB" sz="1800" spc="-1" strike="noStrike">
+                <a:latin typeface="Arial"/>
+              </a:rPr>
+              <a:t>Second Outline Level</a:t>
+            </a:r>
+            <a:endParaRPr b="0" lang="en-GB" sz="1800" spc="-1" strike="noStrike">
+              <a:latin typeface="Arial"/>
+            </a:endParaRPr>
+          </a:p>
+          <a:p>
+            <a:pPr lvl="2" marL="1296000" indent="-288000">
+              <a:spcBef>
+                <a:spcPts val="850"/>
+              </a:spcBef>
+              <a:buClr>
+                <a:srgbClr val="000000"/>
+              </a:buClr>
+              <a:buSzPct val="45000"/>
+              <a:buFont typeface="Wingdings" charset="2"/>
+              <a:buChar char=""/>
+            </a:pPr>
+            <a:r>
+              <a:rPr b="0" lang="en-GB" sz="1800" spc="-1" strike="noStrike">
+                <a:latin typeface="Arial"/>
+              </a:rPr>
+              <a:t>Third Outline Level</a:t>
+            </a:r>
+            <a:endParaRPr b="0" lang="en-GB" sz="1800" spc="-1" strike="noStrike">
+              <a:latin typeface="Arial"/>
+            </a:endParaRPr>
+          </a:p>
+          <a:p>
+            <a:pPr lvl="3" marL="1728000" indent="-216000">
+              <a:spcBef>
+                <a:spcPts val="567"/>
+              </a:spcBef>
+              <a:buClr>
+                <a:srgbClr val="000000"/>
+              </a:buClr>
+              <a:buSzPct val="75000"/>
+              <a:buFont typeface="Symbol" charset="2"/>
+              <a:buChar char=""/>
+            </a:pPr>
+            <a:r>
+              <a:rPr b="0" lang="en-GB" sz="1800" spc="-1" strike="noStrike">
+                <a:latin typeface="Arial"/>
+              </a:rPr>
+              <a:t>Fourth Outline Level</a:t>
+            </a:r>
+            <a:endParaRPr b="0" lang="en-GB" sz="1800" spc="-1" strike="noStrike">
+              <a:latin typeface="Arial"/>
+            </a:endParaRPr>
+          </a:p>
+          <a:p>
+            <a:pPr lvl="4" marL="2160000" indent="-216000">
+              <a:spcBef>
+                <a:spcPts val="283"/>
+              </a:spcBef>
+              <a:buClr>
+                <a:srgbClr val="000000"/>
+              </a:buClr>
+              <a:buSzPct val="45000"/>
+              <a:buFont typeface="Wingdings" charset="2"/>
+              <a:buChar char=""/>
+            </a:pPr>
+            <a:r>
+              <a:rPr b="0" lang="en-GB" sz="1800" spc="-1" strike="noStrike">
+                <a:latin typeface="Arial"/>
+              </a:rPr>
+              <a:t>Fifth Outline Level</a:t>
+            </a:r>
+            <a:endParaRPr b="0" lang="en-GB" sz="1800" spc="-1" strike="noStrike">
+              <a:latin typeface="Arial"/>
+            </a:endParaRPr>
+          </a:p>
+          <a:p>
+            <a:pPr lvl="5" marL="2592000" indent="-216000">
+              <a:spcBef>
+                <a:spcPts val="283"/>
+              </a:spcBef>
+              <a:buClr>
+                <a:srgbClr val="000000"/>
+              </a:buClr>
+              <a:buSzPct val="45000"/>
+              <a:buFont typeface="Wingdings" charset="2"/>
+              <a:buChar char=""/>
+            </a:pPr>
+            <a:r>
+              <a:rPr b="0" lang="en-GB" sz="1800" spc="-1" strike="noStrike">
+                <a:latin typeface="Arial"/>
+              </a:rPr>
+              <a:t>Sixth Outline Level</a:t>
+            </a:r>
+            <a:endParaRPr b="0" lang="en-GB" sz="1800" spc="-1" strike="noStrike">
+              <a:latin typeface="Arial"/>
+            </a:endParaRPr>
+          </a:p>
+          <a:p>
+            <a:pPr lvl="6" marL="3024000" indent="-216000">
+              <a:spcBef>
+                <a:spcPts val="283"/>
+              </a:spcBef>
+              <a:buClr>
+                <a:srgbClr val="000000"/>
+              </a:buClr>
+              <a:buSzPct val="45000"/>
+              <a:buFont typeface="Wingdings" charset="2"/>
+              <a:buChar char=""/>
+            </a:pPr>
+            <a:r>
+              <a:rPr b="0" lang="en-GB" sz="1800" spc="-1" strike="noStrike">
+                <a:latin typeface="Arial"/>
+              </a:rPr>
+              <a:t>Seventh Outline Level</a:t>
+            </a:r>
+            <a:endParaRPr b="0" lang="en-GB" sz="1800" spc="-1" strike="noStrike">
+              <a:latin typeface="Arial"/>
+            </a:endParaRPr>
+          </a:p>
         </p:txBody>
       </p:sp>
       <p:sp>
@@ -2702,13 +2522,13 @@
             <a:spLocks noGrp="1"/>
           </p:cNvSpPr>
           <p:nvPr>
-            <p:ph type="ftr" idx="2"/>
+            <p:ph type="ftr" idx="1"/>
           </p:nvPr>
         </p:nvSpPr>
         <p:spPr>
           <a:xfrm>
             <a:off x="10600920" y="38138040"/>
-            <a:ext cx="10801080" cy="2190240"/>
+            <a:ext cx="10800360" cy="2189520"/>
           </a:xfrm>
           <a:prstGeom prst="rect">
             <a:avLst/>
@@ -2719,11 +2539,14 @@
           </a:ln>
         </p:spPr>
         <p:txBody>
-          <a:bodyPr anchor="ctr">
+          <a:bodyPr lIns="90000" rIns="90000" tIns="45000" bIns="45000" anchor="ctr">
             <a:noAutofit/>
           </a:bodyPr>
           <a:lstStyle>
             <a:lvl1pPr algn="ctr">
+              <a:lnSpc>
+                <a:spcPct val="100000"/>
+              </a:lnSpc>
               <a:buNone/>
               <a:defRPr b="0" lang="en-GB" sz="1400" spc="-1" strike="noStrike">
                 <a:latin typeface="Times New Roman"/>
@@ -2732,6 +2555,9 @@
           </a:lstStyle>
           <a:p>
             <a:pPr algn="ctr">
+              <a:lnSpc>
+                <a:spcPct val="100000"/>
+              </a:lnSpc>
               <a:buNone/>
             </a:pPr>
             <a:r>
@@ -2753,13 +2579,13 @@
             <a:spLocks noGrp="1"/>
           </p:cNvSpPr>
           <p:nvPr>
-            <p:ph type="sldNum" idx="3"/>
+            <p:ph type="sldNum" idx="2"/>
           </p:nvPr>
         </p:nvSpPr>
         <p:spPr>
           <a:xfrm>
             <a:off x="22602600" y="38138040"/>
-            <a:ext cx="7200360" cy="2190240"/>
+            <a:ext cx="7199640" cy="2189520"/>
           </a:xfrm>
           <a:prstGeom prst="rect">
             <a:avLst/>
@@ -2770,7 +2596,7 @@
           </a:ln>
         </p:spPr>
         <p:txBody>
-          <a:bodyPr anchor="ctr">
+          <a:bodyPr lIns="90000" rIns="90000" tIns="45000" bIns="45000" anchor="ctr">
             <a:noAutofit/>
           </a:bodyPr>
           <a:lstStyle>
@@ -2794,7 +2620,7 @@
               </a:lnSpc>
               <a:buNone/>
             </a:pPr>
-            <a:fld id="{8035A410-963A-47DC-B07D-80DCE0F0BF00}" type="slidenum">
+            <a:fld id="{389DEA68-92E8-45A9-A97A-8C946F30C378}" type="slidenum">
               <a:rPr b="0" lang="en-US" sz="3970" spc="-1" strike="noStrike">
                 <a:solidFill>
                   <a:srgbClr val="8b8b8b"/>
@@ -2816,13 +2642,13 @@
             <a:spLocks noGrp="1"/>
           </p:cNvSpPr>
           <p:nvPr>
-            <p:ph type="body"/>
+            <p:ph type="dt" idx="3"/>
           </p:nvPr>
         </p:nvSpPr>
         <p:spPr>
           <a:xfrm>
-            <a:off x="1599840" y="9628200"/>
-            <a:ext cx="28803240" cy="23865480"/>
+            <a:off x="2200320" y="38138040"/>
+            <a:ext cx="7199640" cy="2189520"/>
           </a:xfrm>
           <a:prstGeom prst="rect">
             <a:avLst/>
@@ -2833,224 +2659,25 @@
           </a:ln>
         </p:spPr>
         <p:txBody>
-          <a:bodyPr lIns="0" rIns="0" tIns="0" bIns="0" anchor="t">
-            <a:normAutofit/>
+          <a:bodyPr lIns="90000" rIns="90000" tIns="45000" bIns="45000" anchor="ctr">
+            <a:noAutofit/>
           </a:bodyPr>
-          <a:p>
-            <a:pPr marL="432000" indent="-324000">
-              <a:lnSpc>
-                <a:spcPct val="90000"/>
-              </a:lnSpc>
-              <a:spcBef>
-                <a:spcPts val="1361"/>
-              </a:spcBef>
-              <a:buClr>
-                <a:srgbClr val="000000"/>
-              </a:buClr>
-              <a:buSzPct val="45000"/>
-              <a:buFont typeface="Wingdings" charset="2"/>
-              <a:buChar char=""/>
-            </a:pPr>
+          <a:lstStyle>
+            <a:lvl1pPr>
+              <a:defRPr b="0" lang="en-GB" sz="1400" spc="-1" strike="noStrike">
+                <a:latin typeface="Times New Roman"/>
+              </a:defRPr>
+            </a:lvl1pPr>
+          </a:lstStyle>
+          <a:p>
             <a:r>
-              <a:rPr b="0" lang="en-US" sz="8910" spc="-1" strike="noStrike">
-                <a:solidFill>
-                  <a:srgbClr val="000000"/>
-                </a:solidFill>
-                <a:latin typeface="Calibri"/>
+              <a:rPr b="0" lang="en-GB" sz="1400" spc="-1" strike="noStrike">
+                <a:latin typeface="Times New Roman"/>
               </a:rPr>
-              <a:t>Click to edit the outline text format</a:t>
+              <a:t>&lt;date/time&gt;</a:t>
             </a:r>
-            <a:endParaRPr b="0" lang="en-US" sz="8910" spc="-1" strike="noStrike">
-              <a:solidFill>
-                <a:srgbClr val="000000"/>
-              </a:solidFill>
-              <a:latin typeface="Calibri"/>
-            </a:endParaRPr>
-          </a:p>
-          <a:p>
-            <a:pPr lvl="1" marL="864000" indent="-324000">
-              <a:lnSpc>
-                <a:spcPct val="90000"/>
-              </a:lnSpc>
-              <a:spcBef>
-                <a:spcPts val="1089"/>
-              </a:spcBef>
-              <a:buClr>
-                <a:srgbClr val="000000"/>
-              </a:buClr>
-              <a:buSzPct val="75000"/>
-              <a:buFont typeface="Symbol" charset="2"/>
-              <a:buChar char=""/>
-            </a:pPr>
-            <a:r>
-              <a:rPr b="0" lang="en-US" sz="6360" spc="-1" strike="noStrike">
-                <a:solidFill>
-                  <a:srgbClr val="000000"/>
-                </a:solidFill>
-                <a:latin typeface="Calibri"/>
-              </a:rPr>
-              <a:t>Second Outline Level</a:t>
-            </a:r>
-            <a:endParaRPr b="0" lang="en-US" sz="6360" spc="-1" strike="noStrike">
-              <a:solidFill>
-                <a:srgbClr val="000000"/>
-              </a:solidFill>
-              <a:latin typeface="Calibri"/>
-            </a:endParaRPr>
-          </a:p>
-          <a:p>
-            <a:pPr lvl="2" marL="1296000" indent="-288000">
-              <a:lnSpc>
-                <a:spcPct val="90000"/>
-              </a:lnSpc>
-              <a:spcBef>
-                <a:spcPts val="816"/>
-              </a:spcBef>
-              <a:buClr>
-                <a:srgbClr val="000000"/>
-              </a:buClr>
-              <a:buSzPct val="45000"/>
-              <a:buFont typeface="Wingdings" charset="2"/>
-              <a:buChar char=""/>
-            </a:pPr>
-            <a:r>
-              <a:rPr b="0" lang="en-US" sz="5730" spc="-1" strike="noStrike">
-                <a:solidFill>
-                  <a:srgbClr val="000000"/>
-                </a:solidFill>
-                <a:latin typeface="Calibri"/>
-              </a:rPr>
-              <a:t>Third Outline Level</a:t>
-            </a:r>
-            <a:endParaRPr b="0" lang="en-US" sz="5730" spc="-1" strike="noStrike">
-              <a:solidFill>
-                <a:srgbClr val="000000"/>
-              </a:solidFill>
-              <a:latin typeface="Calibri"/>
-            </a:endParaRPr>
-          </a:p>
-          <a:p>
-            <a:pPr lvl="3" marL="1728000" indent="-216000">
-              <a:lnSpc>
-                <a:spcPct val="90000"/>
-              </a:lnSpc>
-              <a:spcBef>
-                <a:spcPts val="544"/>
-              </a:spcBef>
-              <a:buClr>
-                <a:srgbClr val="000000"/>
-              </a:buClr>
-              <a:buSzPct val="75000"/>
-              <a:buFont typeface="Symbol" charset="2"/>
-              <a:buChar char=""/>
-            </a:pPr>
-            <a:r>
-              <a:rPr b="0" lang="en-US" sz="5730" spc="-1" strike="noStrike">
-                <a:solidFill>
-                  <a:srgbClr val="000000"/>
-                </a:solidFill>
-                <a:latin typeface="Calibri"/>
-              </a:rPr>
-              <a:t>Fourth Outline Level</a:t>
-            </a:r>
-            <a:endParaRPr b="0" lang="en-US" sz="5730" spc="-1" strike="noStrike">
-              <a:solidFill>
-                <a:srgbClr val="000000"/>
-              </a:solidFill>
-              <a:latin typeface="Calibri"/>
-            </a:endParaRPr>
-          </a:p>
-          <a:p>
-            <a:pPr lvl="4" marL="2160000" indent="-216000">
-              <a:lnSpc>
-                <a:spcPct val="90000"/>
-              </a:lnSpc>
-              <a:spcBef>
-                <a:spcPts val="272"/>
-              </a:spcBef>
-              <a:buClr>
-                <a:srgbClr val="000000"/>
-              </a:buClr>
-              <a:buSzPct val="45000"/>
-              <a:buFont typeface="Wingdings" charset="2"/>
-              <a:buChar char=""/>
-            </a:pPr>
-            <a:r>
-              <a:rPr b="0" lang="en-US" sz="1920" spc="-1" strike="noStrike">
-                <a:solidFill>
-                  <a:srgbClr val="000000"/>
-                </a:solidFill>
-                <a:latin typeface="Calibri"/>
-              </a:rPr>
-              <a:t>Fifth Outline Level</a:t>
-            </a:r>
-            <a:endParaRPr b="0" lang="en-US" sz="1920" spc="-1" strike="noStrike">
-              <a:solidFill>
-                <a:srgbClr val="000000"/>
-              </a:solidFill>
-              <a:latin typeface="Calibri"/>
-            </a:endParaRPr>
-          </a:p>
-          <a:p>
-            <a:pPr lvl="5" marL="2592000" indent="-216000">
-              <a:lnSpc>
-                <a:spcPct val="90000"/>
-              </a:lnSpc>
-              <a:spcBef>
-                <a:spcPts val="272"/>
-              </a:spcBef>
-              <a:buClr>
-                <a:srgbClr val="000000"/>
-              </a:buClr>
-              <a:buSzPct val="45000"/>
-              <a:buFont typeface="Wingdings" charset="2"/>
-              <a:buChar char=""/>
-            </a:pPr>
-            <a:r>
-              <a:rPr b="0" lang="en-US" sz="1920" spc="-1" strike="noStrike">
-                <a:solidFill>
-                  <a:srgbClr val="000000"/>
-                </a:solidFill>
-                <a:latin typeface="Calibri"/>
-              </a:rPr>
-              <a:t>Sixth Outline Level</a:t>
-            </a:r>
-            <a:endParaRPr b="0" lang="en-US" sz="1920" spc="-1" strike="noStrike">
-              <a:solidFill>
-                <a:srgbClr val="000000"/>
-              </a:solidFill>
-              <a:latin typeface="Calibri"/>
-            </a:endParaRPr>
-          </a:p>
-          <a:p>
-            <a:pPr lvl="6" marL="3024000" indent="-216000">
-              <a:lnSpc>
-                <a:spcPct val="90000"/>
-              </a:lnSpc>
-              <a:spcBef>
-                <a:spcPts val="272"/>
-              </a:spcBef>
-              <a:buClr>
-                <a:srgbClr val="000000"/>
-              </a:buClr>
-              <a:buSzPct val="45000"/>
-              <a:buFont typeface="Wingdings" charset="2"/>
-              <a:buChar char=""/>
-            </a:pPr>
-            <a:r>
-              <a:rPr b="0" lang="en-US" sz="1920" spc="-1" strike="noStrike">
-                <a:solidFill>
-                  <a:srgbClr val="000000"/>
-                </a:solidFill>
-                <a:latin typeface="Calibri"/>
-              </a:rPr>
-              <a:t>Seventh Outline Level</a:t>
-            </a:r>
-            <a:endParaRPr b="0" lang="en-US" sz="1920" spc="-1" strike="noStrike">
-              <a:solidFill>
-                <a:srgbClr val="000000"/>
-              </a:solidFill>
-              <a:latin typeface="Calibri"/>
+            <a:endParaRPr b="0" lang="en-GB" sz="1400" spc="-1" strike="noStrike">
+              <a:latin typeface="Times New Roman"/>
             </a:endParaRPr>
           </a:p>
         </p:txBody>
@@ -3108,7 +2735,7 @@
         <p:spPr>
           <a:xfrm>
             <a:off x="16102800" y="14040000"/>
-            <a:ext cx="15037200" cy="18000000"/>
+            <a:ext cx="15036480" cy="17999280"/>
           </a:xfrm>
           <a:prstGeom prst="rect">
             <a:avLst/>
@@ -3158,6 +2785,7 @@
                   <a:srgbClr val="ffffff"/>
                 </a:solidFill>
                 <a:latin typeface="Calibri"/>
+                <a:ea typeface="DejaVu Sans"/>
               </a:rPr>
               <a:t>v</a:t>
             </a:r>
@@ -3176,7 +2804,7 @@
         <p:spPr>
           <a:xfrm>
             <a:off x="0" y="38340000"/>
-            <a:ext cx="32220000" cy="2842920"/>
+            <a:ext cx="32219280" cy="2842200"/>
           </a:xfrm>
           <a:prstGeom prst="rect">
             <a:avLst/>
@@ -3215,7 +2843,7 @@
         <p:spPr>
           <a:xfrm>
             <a:off x="0" y="-62280"/>
-            <a:ext cx="32220000" cy="5945400"/>
+            <a:ext cx="32219280" cy="5944680"/>
           </a:xfrm>
           <a:prstGeom prst="rect">
             <a:avLst/>
@@ -3254,7 +2882,7 @@
         <p:spPr>
           <a:xfrm>
             <a:off x="1882800" y="416160"/>
-            <a:ext cx="27377640" cy="4724280"/>
+            <a:ext cx="27376920" cy="4725000"/>
           </a:xfrm>
           <a:prstGeom prst="rect">
             <a:avLst/>
@@ -3291,7 +2919,7 @@
               </a:rPr>
               <a:t>Fornix and forceps are key regions of white matter brain age</a:t>
             </a:r>
-            <a:endParaRPr b="1" lang="en-GB" sz="11700" spc="-1" strike="noStrike">
+            <a:endParaRPr b="0" lang="en-GB" sz="11700" spc="-1" strike="noStrike">
               <a:latin typeface="Arial"/>
             </a:endParaRPr>
           </a:p>
@@ -3306,7 +2934,7 @@
         <p:spPr>
           <a:xfrm>
             <a:off x="6042240" y="39047400"/>
-            <a:ext cx="18173520" cy="2100600"/>
+            <a:ext cx="18172800" cy="2100600"/>
           </a:xfrm>
           <a:prstGeom prst="rect">
             <a:avLst/>
@@ -3359,6 +2987,7 @@
                   <a:srgbClr val="ffffff"/>
                 </a:solidFill>
                 <a:latin typeface="Segoe UI Light"/>
+                <a:ea typeface="DejaVu Sans"/>
               </a:rPr>
               <a:t>Maximov</a:t>
             </a:r>
@@ -3377,7 +3006,7 @@
         <p:spPr>
           <a:xfrm>
             <a:off x="1800000" y="28538280"/>
-            <a:ext cx="13154760" cy="9477720"/>
+            <a:ext cx="13154040" cy="9477000"/>
           </a:xfrm>
           <a:prstGeom prst="rect">
             <a:avLst/>
@@ -3427,6 +3056,7 @@
                   <a:srgbClr val="ffffff"/>
                 </a:solidFill>
                 <a:latin typeface="Calibri"/>
+                <a:ea typeface="DejaVu Sans"/>
               </a:rPr>
               <a:t>v</a:t>
             </a:r>
@@ -3445,7 +3075,7 @@
         <p:spPr>
           <a:xfrm>
             <a:off x="1897560" y="14010120"/>
-            <a:ext cx="13057200" cy="14105880"/>
+            <a:ext cx="13056480" cy="14105160"/>
           </a:xfrm>
           <a:prstGeom prst="rect">
             <a:avLst/>
@@ -3495,6 +3125,7 @@
                   <a:srgbClr val="ffffff"/>
                 </a:solidFill>
                 <a:latin typeface="Calibri"/>
+                <a:ea typeface="DejaVu Sans"/>
               </a:rPr>
               <a:t>v</a:t>
             </a:r>
@@ -3513,7 +3144,7 @@
         <p:spPr>
           <a:xfrm>
             <a:off x="2138400" y="13825080"/>
-            <a:ext cx="12528720" cy="2970000"/>
+            <a:ext cx="12528000" cy="2970000"/>
           </a:xfrm>
           <a:prstGeom prst="rect">
             <a:avLst/>
@@ -3541,7 +3172,7 @@
               <a:buNone/>
             </a:pPr>
             <a:r>
-              <a:rPr b="0" lang="en-US" sz="4200" spc="-1" strike="noStrike">
+              <a:rPr b="1" lang="en-US" sz="4200" spc="-1" strike="noStrike">
                 <a:solidFill>
                   <a:srgbClr val="000000"/>
                 </a:solidFill>
@@ -3551,7 +3182,7 @@
               <a:t>Result 1:</a:t>
             </a:r>
             <a:r>
-              <a:rPr b="0" lang="en-US" sz="4200" spc="-1" strike="noStrike">
+              <a:rPr b="1" lang="en-US" sz="4200" spc="-1" strike="noStrike">
                 <a:solidFill>
                   <a:srgbClr val="000000"/>
                 </a:solidFill>
@@ -3585,7 +3216,7 @@
         <p:spPr>
           <a:xfrm>
             <a:off x="2035800" y="28353240"/>
-            <a:ext cx="13334760" cy="2970720"/>
+            <a:ext cx="13334040" cy="2970000"/>
           </a:xfrm>
           <a:prstGeom prst="rect">
             <a:avLst/>
@@ -3613,7 +3244,7 @@
               <a:buNone/>
             </a:pPr>
             <a:r>
-              <a:rPr b="0" lang="en-US" sz="4200" spc="-1" strike="noStrike">
+              <a:rPr b="1" lang="en-US" sz="4200" spc="-1" strike="noStrike">
                 <a:solidFill>
                   <a:srgbClr val="000000"/>
                 </a:solidFill>
@@ -3630,17 +3261,7 @@
                 <a:latin typeface="Segoe UI"/>
                 <a:ea typeface="Segoe UI Black"/>
               </a:rPr>
-              <a:t> </a:t>
-            </a:r>
-            <a:r>
-              <a:rPr b="0" lang="en-US" sz="4200" spc="-1" strike="noStrike">
-                <a:solidFill>
-                  <a:srgbClr val="000000"/>
-                </a:solidFill>
-                <a:latin typeface="Segoe UI"/>
-                <a:ea typeface="Segoe UI Black"/>
-              </a:rPr>
-              <a:t>Fornix and forceps minor features explaind most variance in age across diffusion approaches.</a:t>
+              <a:t> Fornix and forceps minor features explained most variance in age across diffusion approaches.</a:t>
             </a:r>
             <a:endParaRPr b="0" lang="en-GB" sz="4200" spc="-1" strike="noStrike">
               <a:latin typeface="Arial"/>
@@ -3657,7 +3278,7 @@
         <p:spPr>
           <a:xfrm>
             <a:off x="1882800" y="8890920"/>
-            <a:ext cx="28444320" cy="4705560"/>
+            <a:ext cx="29256840" cy="4704840"/>
           </a:xfrm>
           <a:prstGeom prst="rect">
             <a:avLst/>
@@ -3706,7 +3327,27 @@
                 <a:latin typeface="Segoe UI"/>
                 <a:ea typeface="Segoe UI Black"/>
               </a:rPr>
-              <a:t>Unveiling the details of white matter maturation throughout ageing is a fundamental question for understanding the ageing brain. In an extensive comparison of brain age predictions and age-associations of WM features from different diffusion approaches, we analyzed UK Biobank diffusion magnetic resonance imaging data across midlife and older age (N = 35,749, 44.6–82.8 years of age).</a:t>
+              <a:t>Unveiling the details of white matter maturation throughout ageing is a fundamental question for understanding the ageing brain. In an extensive comparison of brain age predictions and age-associations of WM features from different diffusion approaches, we analyzed UK Biobank diffusion magnetic resonance imaging data across midlife and older age (</a:t>
+            </a:r>
+            <a:r>
+              <a:rPr b="0" i="1" lang="en-US" sz="4200" spc="-1" strike="noStrike">
+                <a:solidFill>
+                  <a:srgbClr val="000000"/>
+                </a:solidFill>
+                <a:latin typeface="Segoe UI"/>
+                <a:ea typeface="Segoe UI Black"/>
+              </a:rPr>
+              <a:t>N</a:t>
+            </a:r>
+            <a:r>
+              <a:rPr b="0" lang="en-US" sz="4200" spc="-1" strike="noStrike">
+                <a:solidFill>
+                  <a:srgbClr val="000000"/>
+                </a:solidFill>
+                <a:latin typeface="Segoe UI"/>
+                <a:ea typeface="Segoe UI Black"/>
+              </a:rPr>
+              <a:t> = 35,749, 44.6–82.8 years of age).</a:t>
             </a:r>
             <a:endParaRPr b="0" lang="en-GB" sz="4200" spc="-1" strike="noStrike">
               <a:latin typeface="Arial"/>
@@ -3723,7 +3364,7 @@
         <p:spPr>
           <a:xfrm>
             <a:off x="1839600" y="6523200"/>
-            <a:ext cx="29175840" cy="1992600"/>
+            <a:ext cx="29175120" cy="1991160"/>
           </a:xfrm>
           <a:prstGeom prst="rect">
             <a:avLst/>
@@ -3756,6 +3397,7 @@
                   <a:srgbClr val="262626"/>
                 </a:solidFill>
                 <a:latin typeface="Segoe UI"/>
+                <a:ea typeface="DejaVu Sans"/>
               </a:rPr>
               <a:t>Brain-wide associations between white matter and age highlight the role of fornix microstructure in brain ageing</a:t>
             </a:r>
@@ -3774,7 +3416,7 @@
         <p:spPr>
           <a:xfrm>
             <a:off x="16560000" y="13921920"/>
-            <a:ext cx="13334760" cy="2970000"/>
+            <a:ext cx="13334040" cy="2970000"/>
           </a:xfrm>
           <a:prstGeom prst="rect">
             <a:avLst/>
@@ -3802,7 +3444,7 @@
               <a:buNone/>
             </a:pPr>
             <a:r>
-              <a:rPr b="0" lang="en-US" sz="4200" spc="-1" strike="noStrike">
+              <a:rPr b="1" lang="en-US" sz="4200" spc="-1" strike="noStrike">
                 <a:solidFill>
                   <a:srgbClr val="000000"/>
                 </a:solidFill>
@@ -3819,17 +3461,7 @@
                 <a:latin typeface="Segoe UI"/>
                 <a:ea typeface="Segoe UI Black"/>
               </a:rPr>
-              <a:t> </a:t>
-            </a:r>
-            <a:r>
-              <a:rPr b="0" lang="en-US" sz="4200" spc="-1" strike="noStrike">
-                <a:solidFill>
-                  <a:srgbClr val="000000"/>
-                </a:solidFill>
-                <a:latin typeface="Segoe UI"/>
-                <a:ea typeface="Segoe UI Black"/>
-              </a:rPr>
-              <a:t>We present general patterns of white matter deterioration for higher ages in fornix, forceps minor, and across the brain.</a:t>
+              <a:t> We present general patterns of white matter deterioration for higher ages in fornix, forceps minor, and across the brain.</a:t>
             </a:r>
             <a:endParaRPr b="0" lang="en-GB" sz="4200" spc="-1" strike="noStrike">
               <a:latin typeface="Arial"/>
@@ -3849,8 +3481,8 @@
         </p:blipFill>
         <p:spPr>
           <a:xfrm>
-            <a:off x="2923920" y="16983360"/>
-            <a:ext cx="10943640" cy="10943640"/>
+            <a:off x="2923920" y="16793640"/>
+            <a:ext cx="10942920" cy="10942920"/>
           </a:xfrm>
           <a:prstGeom prst="rect">
             <a:avLst/>
@@ -3868,7 +3500,7 @@
         </p:nvGraphicFramePr>
         <p:xfrm>
           <a:off x="2085480" y="31405680"/>
-          <a:ext cx="12418920" cy="6518520"/>
+          <a:ext cx="12418920" cy="6369480"/>
         </p:xfrm>
         <a:graphic>
           <a:graphicData uri="http://schemas.openxmlformats.org/drawingml/2006/table">
@@ -3886,17 +3518,23 @@
               <a:tr h="716760">
                 <a:tc>
                   <a:txBody>
-                    <a:bodyPr lIns="90000" rIns="90000" tIns="46800" bIns="46800" anchor="t">
+                    <a:bodyPr lIns="90000" rIns="90000" anchor="t">
                       <a:noAutofit/>
                     </a:bodyPr>
                     <a:p>
+                      <a:pPr>
+                        <a:lnSpc>
+                          <a:spcPct val="100000"/>
+                        </a:lnSpc>
+                        <a:buNone/>
+                      </a:pPr>
                       <a:r>
                         <a:rPr b="1" lang="en-GB" sz="1600" spc="-1" strike="noStrike">
                           <a:latin typeface="Arial"/>
                         </a:rPr>
                         <a:t>BRIA</a:t>
                       </a:r>
-                      <a:endParaRPr b="1" lang="en-GB" sz="1600" spc="-1" strike="noStrike">
+                      <a:endParaRPr b="0" lang="en-GB" sz="1600" spc="-1" strike="noStrike">
                         <a:latin typeface="Arial"/>
                       </a:endParaRPr>
                     </a:p>
@@ -3927,17 +3565,23 @@
                 </a:tc>
                 <a:tc>
                   <a:txBody>
-                    <a:bodyPr lIns="90000" rIns="90000" tIns="46800" bIns="46800" anchor="t">
+                    <a:bodyPr lIns="90000" rIns="90000" anchor="t">
                       <a:noAutofit/>
                     </a:bodyPr>
                     <a:p>
+                      <a:pPr>
+                        <a:lnSpc>
+                          <a:spcPct val="100000"/>
+                        </a:lnSpc>
+                        <a:buNone/>
+                      </a:pPr>
                       <a:r>
                         <a:rPr b="1" lang="en-GB" sz="1600" spc="-1" strike="noStrike">
                           <a:latin typeface="Arial"/>
                         </a:rPr>
                         <a:t>DKI</a:t>
                       </a:r>
-                      <a:endParaRPr b="1" lang="en-GB" sz="1600" spc="-1" strike="noStrike">
+                      <a:endParaRPr b="0" lang="en-GB" sz="1600" spc="-1" strike="noStrike">
                         <a:latin typeface="Arial"/>
                       </a:endParaRPr>
                     </a:p>
@@ -3968,17 +3612,23 @@
                 </a:tc>
                 <a:tc>
                   <a:txBody>
-                    <a:bodyPr lIns="90000" rIns="90000" tIns="46800" bIns="46800" anchor="t">
+                    <a:bodyPr lIns="90000" rIns="90000" anchor="t">
                       <a:noAutofit/>
                     </a:bodyPr>
                     <a:p>
+                      <a:pPr>
+                        <a:lnSpc>
+                          <a:spcPct val="100000"/>
+                        </a:lnSpc>
+                        <a:buNone/>
+                      </a:pPr>
                       <a:r>
                         <a:rPr b="1" lang="en-GB" sz="1600" spc="-1" strike="noStrike">
                           <a:latin typeface="Arial"/>
                         </a:rPr>
                         <a:t>DTI</a:t>
                       </a:r>
-                      <a:endParaRPr b="1" lang="en-GB" sz="1600" spc="-1" strike="noStrike">
+                      <a:endParaRPr b="0" lang="en-GB" sz="1600" spc="-1" strike="noStrike">
                         <a:latin typeface="Arial"/>
                       </a:endParaRPr>
                     </a:p>
@@ -4009,17 +3659,23 @@
                 </a:tc>
                 <a:tc>
                   <a:txBody>
-                    <a:bodyPr lIns="90000" rIns="90000" tIns="46800" bIns="46800" anchor="t">
+                    <a:bodyPr lIns="90000" rIns="90000" anchor="t">
                       <a:noAutofit/>
                     </a:bodyPr>
                     <a:p>
+                      <a:pPr>
+                        <a:lnSpc>
+                          <a:spcPct val="100000"/>
+                        </a:lnSpc>
+                        <a:buNone/>
+                      </a:pPr>
                       <a:r>
                         <a:rPr b="1" lang="en-GB" sz="1600" spc="-1" strike="noStrike">
                           <a:latin typeface="Arial"/>
                         </a:rPr>
                         <a:t>SMT</a:t>
                       </a:r>
-                      <a:endParaRPr b="1" lang="en-GB" sz="1600" spc="-1" strike="noStrike">
+                      <a:endParaRPr b="0" lang="en-GB" sz="1600" spc="-1" strike="noStrike">
                         <a:latin typeface="Arial"/>
                       </a:endParaRPr>
                     </a:p>
@@ -4050,17 +3706,23 @@
                 </a:tc>
                 <a:tc>
                   <a:txBody>
-                    <a:bodyPr lIns="90000" rIns="90000" tIns="46800" bIns="46800" anchor="t">
+                    <a:bodyPr lIns="90000" rIns="90000" anchor="t">
                       <a:noAutofit/>
                     </a:bodyPr>
                     <a:p>
+                      <a:pPr>
+                        <a:lnSpc>
+                          <a:spcPct val="100000"/>
+                        </a:lnSpc>
+                        <a:buNone/>
+                      </a:pPr>
                       <a:r>
                         <a:rPr b="1" lang="en-GB" sz="1600" spc="-1" strike="noStrike">
                           <a:latin typeface="Arial"/>
                         </a:rPr>
                         <a:t>mcSMT</a:t>
                       </a:r>
-                      <a:endParaRPr b="1" lang="en-GB" sz="1600" spc="-1" strike="noStrike">
+                      <a:endParaRPr b="0" lang="en-GB" sz="1600" spc="-1" strike="noStrike">
                         <a:latin typeface="Arial"/>
                       </a:endParaRPr>
                     </a:p>
@@ -4091,17 +3753,23 @@
                 </a:tc>
                 <a:tc>
                   <a:txBody>
-                    <a:bodyPr lIns="90000" rIns="90000" tIns="46800" bIns="46800" anchor="t">
+                    <a:bodyPr lIns="90000" rIns="90000" anchor="t">
                       <a:noAutofit/>
                     </a:bodyPr>
                     <a:p>
+                      <a:pPr>
+                        <a:lnSpc>
+                          <a:spcPct val="100000"/>
+                        </a:lnSpc>
+                        <a:buNone/>
+                      </a:pPr>
                       <a:r>
                         <a:rPr b="1" lang="en-GB" sz="1600" spc="-1" strike="noStrike">
                           <a:latin typeface="Arial"/>
                         </a:rPr>
                         <a:t>WMTI</a:t>
                       </a:r>
-                      <a:endParaRPr b="1" lang="en-GB" sz="1600" spc="-1" strike="noStrike">
+                      <a:endParaRPr b="0" lang="en-GB" sz="1600" spc="-1" strike="noStrike">
                         <a:latin typeface="Arial"/>
                       </a:endParaRPr>
                     </a:p>
@@ -4132,17 +3800,23 @@
                 </a:tc>
                 <a:tc>
                   <a:txBody>
-                    <a:bodyPr lIns="90000" rIns="90000" tIns="46800" bIns="46800" anchor="t">
+                    <a:bodyPr lIns="90000" rIns="90000" anchor="t">
                       <a:noAutofit/>
                     </a:bodyPr>
                     <a:p>
+                      <a:pPr>
+                        <a:lnSpc>
+                          <a:spcPct val="100000"/>
+                        </a:lnSpc>
+                        <a:buNone/>
+                      </a:pPr>
                       <a:r>
                         <a:rPr b="1" lang="en-GB" sz="1600" spc="-1" strike="noStrike">
                           <a:latin typeface="Arial"/>
                         </a:rPr>
                         <a:t>Multimodal</a:t>
                       </a:r>
-                      <a:endParaRPr b="1" lang="en-GB" sz="1600" spc="-1" strike="noStrike">
+                      <a:endParaRPr b="0" lang="en-GB" sz="1600" spc="-1" strike="noStrike">
                         <a:latin typeface="Arial"/>
                       </a:endParaRPr>
                     </a:p>
@@ -4175,7 +3849,7 @@
               <a:tr h="1071720">
                 <a:tc>
                   <a:txBody>
-                    <a:bodyPr lIns="90000" rIns="90000" tIns="46800" bIns="46800" anchor="t">
+                    <a:bodyPr lIns="90000" rIns="90000" anchor="t">
                       <a:noAutofit/>
                     </a:bodyPr>
                     <a:p>
@@ -4193,7 +3867,6 @@
                       </a:r>
                       <a:endParaRPr b="0" lang="en-GB" sz="1600" spc="-1" strike="noStrike">
                         <a:latin typeface="Arial"/>
-                        <a:ea typeface="Noto Sans CJK SC"/>
                       </a:endParaRPr>
                     </a:p>
                   </a:txBody>
@@ -4217,10 +3890,16 @@
                 </a:tc>
                 <a:tc>
                   <a:txBody>
-                    <a:bodyPr lIns="90000" rIns="90000" tIns="46800" bIns="46800" anchor="t">
+                    <a:bodyPr lIns="90000" rIns="90000" anchor="t">
                       <a:noAutofit/>
                     </a:bodyPr>
                     <a:p>
+                      <a:pPr>
+                        <a:lnSpc>
+                          <a:spcPct val="100000"/>
+                        </a:lnSpc>
+                        <a:buNone/>
+                      </a:pPr>
                       <a:r>
                         <a:rPr b="0" lang="en-GB" sz="1600" spc="-1" strike="noStrike">
                           <a:latin typeface="Arial"/>
@@ -4232,6 +3911,12 @@
                       </a:endParaRPr>
                     </a:p>
                     <a:p>
+                      <a:pPr>
+                        <a:lnSpc>
+                          <a:spcPct val="100000"/>
+                        </a:lnSpc>
+                        <a:buNone/>
+                      </a:pPr>
                       <a:r>
                         <a:rPr b="0" lang="en-GB" sz="1600" spc="-1" strike="noStrike">
                           <a:latin typeface="Arial"/>
@@ -4255,7 +3940,7 @@
                         <a:srgbClr val="ffffff"/>
                       </a:solidFill>
                     </a:lnT>
-                    <a:lnB>
+                    <a:lnB w="720">
                       <a:noFill/>
                     </a:lnB>
                     <a:solidFill>
@@ -4265,10 +3950,16 @@
                 </a:tc>
                 <a:tc>
                   <a:txBody>
-                    <a:bodyPr lIns="90000" rIns="90000" tIns="46800" bIns="46800" anchor="t">
+                    <a:bodyPr lIns="90000" rIns="90000" anchor="t">
                       <a:noAutofit/>
                     </a:bodyPr>
                     <a:p>
+                      <a:pPr>
+                        <a:lnSpc>
+                          <a:spcPct val="100000"/>
+                        </a:lnSpc>
+                        <a:buNone/>
+                      </a:pPr>
                       <a:r>
                         <a:rPr b="0" lang="en-GB" sz="1600" spc="-1" strike="noStrike">
                           <a:latin typeface="Arial"/>
@@ -4308,10 +3999,16 @@
                 </a:tc>
                 <a:tc>
                   <a:txBody>
-                    <a:bodyPr lIns="90000" rIns="90000" tIns="46800" bIns="46800" anchor="t">
+                    <a:bodyPr lIns="90000" rIns="90000" anchor="t">
                       <a:noAutofit/>
                     </a:bodyPr>
                     <a:p>
+                      <a:pPr>
+                        <a:lnSpc>
+                          <a:spcPct val="100000"/>
+                        </a:lnSpc>
+                        <a:buNone/>
+                      </a:pPr>
                       <a:r>
                         <a:rPr b="0" lang="en-GB" sz="1600" spc="-1" strike="noStrike">
                           <a:latin typeface="Arial"/>
@@ -4323,6 +4020,12 @@
                       </a:endParaRPr>
                     </a:p>
                     <a:p>
+                      <a:pPr>
+                        <a:lnSpc>
+                          <a:spcPct val="100000"/>
+                        </a:lnSpc>
+                        <a:buNone/>
+                      </a:pPr>
                       <a:r>
                         <a:rPr b="0" lang="en-GB" sz="1600" spc="-1" strike="noStrike">
                           <a:latin typeface="Arial"/>
@@ -4362,10 +4065,16 @@
                 </a:tc>
                 <a:tc>
                   <a:txBody>
-                    <a:bodyPr lIns="90000" rIns="90000" tIns="46800" bIns="46800" anchor="t">
+                    <a:bodyPr lIns="90000" rIns="90000" anchor="t">
                       <a:noAutofit/>
                     </a:bodyPr>
                     <a:p>
+                      <a:pPr>
+                        <a:lnSpc>
+                          <a:spcPct val="100000"/>
+                        </a:lnSpc>
+                        <a:buNone/>
+                      </a:pPr>
                       <a:r>
                         <a:rPr b="0" lang="en-GB" sz="1600" spc="-1" strike="noStrike">
                           <a:latin typeface="Arial"/>
@@ -4377,6 +4086,12 @@
                       </a:endParaRPr>
                     </a:p>
                     <a:p>
+                      <a:pPr>
+                        <a:lnSpc>
+                          <a:spcPct val="100000"/>
+                        </a:lnSpc>
+                        <a:buNone/>
+                      </a:pPr>
                       <a:r>
                         <a:rPr b="0" lang="en-GB" sz="1600" spc="-1" strike="noStrike">
                           <a:latin typeface="Arial"/>
@@ -4416,10 +4131,16 @@
                 </a:tc>
                 <a:tc>
                   <a:txBody>
-                    <a:bodyPr lIns="90000" rIns="90000" tIns="46800" bIns="46800" anchor="t">
+                    <a:bodyPr lIns="90000" rIns="90000" anchor="t">
                       <a:noAutofit/>
                     </a:bodyPr>
                     <a:p>
+                      <a:pPr>
+                        <a:lnSpc>
+                          <a:spcPct val="100000"/>
+                        </a:lnSpc>
+                        <a:buNone/>
+                      </a:pPr>
                       <a:r>
                         <a:rPr b="0" lang="en-GB" sz="1600" spc="-1" strike="noStrike">
                           <a:latin typeface="Arial"/>
@@ -4431,6 +4152,12 @@
                       </a:endParaRPr>
                     </a:p>
                     <a:p>
+                      <a:pPr>
+                        <a:lnSpc>
+                          <a:spcPct val="100000"/>
+                        </a:lnSpc>
+                        <a:buNone/>
+                      </a:pPr>
                       <a:r>
                         <a:rPr b="0" lang="en-GB" sz="1600" spc="-1" strike="noStrike">
                           <a:latin typeface="Arial"/>
@@ -4458,7 +4185,7 @@
                         <a:srgbClr val="ffffff"/>
                       </a:solidFill>
                     </a:lnT>
-                    <a:lnB>
+                    <a:lnB w="720">
                       <a:noFill/>
                     </a:lnB>
                     <a:solidFill>
@@ -4468,10 +4195,16 @@
                 </a:tc>
                 <a:tc>
                   <a:txBody>
-                    <a:bodyPr lIns="90000" rIns="90000" tIns="46800" bIns="46800" anchor="t">
+                    <a:bodyPr lIns="90000" rIns="90000" anchor="t">
                       <a:noAutofit/>
                     </a:bodyPr>
                     <a:p>
+                      <a:pPr>
+                        <a:lnSpc>
+                          <a:spcPct val="100000"/>
+                        </a:lnSpc>
+                        <a:buNone/>
+                      </a:pPr>
                       <a:r>
                         <a:rPr b="0" lang="en-GB" sz="1600" spc="-1" strike="noStrike">
                           <a:latin typeface="Arial"/>
@@ -4483,6 +4216,12 @@
                       </a:endParaRPr>
                     </a:p>
                     <a:p>
+                      <a:pPr>
+                        <a:lnSpc>
+                          <a:spcPct val="100000"/>
+                        </a:lnSpc>
+                        <a:buNone/>
+                      </a:pPr>
                       <a:r>
                         <a:rPr b="0" lang="en-GB" sz="1600" spc="-1" strike="noStrike">
                           <a:latin typeface="Arial"/>
@@ -4524,10 +4263,16 @@
               <a:tr h="1071720">
                 <a:tc>
                   <a:txBody>
-                    <a:bodyPr lIns="90000" rIns="90000" tIns="46800" bIns="46800" anchor="t">
+                    <a:bodyPr lIns="90000" rIns="90000" anchor="t">
                       <a:noAutofit/>
                     </a:bodyPr>
                     <a:p>
+                      <a:pPr>
+                        <a:lnSpc>
+                          <a:spcPct val="100000"/>
+                        </a:lnSpc>
+                        <a:buNone/>
+                      </a:pPr>
                       <a:r>
                         <a:rPr b="0" lang="en-GB" sz="1600" spc="-1" strike="noStrike">
                           <a:latin typeface="Arial"/>
@@ -4539,6 +4284,12 @@
                       </a:endParaRPr>
                     </a:p>
                     <a:p>
+                      <a:pPr>
+                        <a:lnSpc>
+                          <a:spcPct val="100000"/>
+                        </a:lnSpc>
+                        <a:buNone/>
+                      </a:pPr>
                       <a:r>
                         <a:rPr b="0" lang="en-GB" sz="1600" spc="-1" strike="noStrike">
                           <a:latin typeface="Arial"/>
@@ -4574,10 +4325,16 @@
                 </a:tc>
                 <a:tc>
                   <a:txBody>
-                    <a:bodyPr lIns="90000" rIns="90000" tIns="46800" bIns="46800" anchor="t">
+                    <a:bodyPr lIns="90000" rIns="90000" anchor="t">
                       <a:noAutofit/>
                     </a:bodyPr>
                     <a:p>
+                      <a:pPr>
+                        <a:lnSpc>
+                          <a:spcPct val="100000"/>
+                        </a:lnSpc>
+                        <a:buNone/>
+                      </a:pPr>
                       <a:r>
                         <a:rPr b="0" lang="en-GB" sz="1600" spc="-1" strike="noStrike">
                           <a:latin typeface="Arial"/>
@@ -4617,10 +4374,16 @@
                 </a:tc>
                 <a:tc>
                   <a:txBody>
-                    <a:bodyPr lIns="90000" rIns="90000" tIns="46800" bIns="46800" anchor="t">
+                    <a:bodyPr lIns="90000" rIns="90000" anchor="t">
                       <a:noAutofit/>
                     </a:bodyPr>
                     <a:p>
+                      <a:pPr>
+                        <a:lnSpc>
+                          <a:spcPct val="100000"/>
+                        </a:lnSpc>
+                        <a:buNone/>
+                      </a:pPr>
                       <a:r>
                         <a:rPr b="0" lang="en-GB" sz="1600" spc="-1" strike="noStrike">
                           <a:latin typeface="Arial"/>
@@ -4632,6 +4395,12 @@
                       </a:endParaRPr>
                     </a:p>
                     <a:p>
+                      <a:pPr>
+                        <a:lnSpc>
+                          <a:spcPct val="100000"/>
+                        </a:lnSpc>
+                        <a:buNone/>
+                      </a:pPr>
                       <a:r>
                         <a:rPr b="0" lang="en-GB" sz="1600" spc="-1" strike="noStrike">
                           <a:latin typeface="Arial"/>
@@ -4663,10 +4432,16 @@
                 </a:tc>
                 <a:tc>
                   <a:txBody>
-                    <a:bodyPr lIns="90000" rIns="90000" tIns="46800" bIns="46800" anchor="t">
+                    <a:bodyPr lIns="90000" rIns="90000" anchor="t">
                       <a:noAutofit/>
                     </a:bodyPr>
                     <a:p>
+                      <a:pPr>
+                        <a:lnSpc>
+                          <a:spcPct val="100000"/>
+                        </a:lnSpc>
+                        <a:buNone/>
+                      </a:pPr>
                       <a:r>
                         <a:rPr b="0" lang="en-GB" sz="1600" spc="-1" strike="noStrike">
                           <a:latin typeface="Arial"/>
@@ -4678,6 +4453,12 @@
                       </a:endParaRPr>
                     </a:p>
                     <a:p>
+                      <a:pPr>
+                        <a:lnSpc>
+                          <a:spcPct val="100000"/>
+                        </a:lnSpc>
+                        <a:buNone/>
+                      </a:pPr>
                       <a:r>
                         <a:rPr b="0" lang="en-GB" sz="1600" spc="-1" strike="noStrike">
                           <a:latin typeface="Arial"/>
@@ -4713,10 +4494,16 @@
                 </a:tc>
                 <a:tc>
                   <a:txBody>
-                    <a:bodyPr lIns="90000" rIns="90000" tIns="46800" bIns="46800" anchor="t">
+                    <a:bodyPr lIns="90000" rIns="90000" anchor="t">
                       <a:noAutofit/>
                     </a:bodyPr>
                     <a:p>
+                      <a:pPr>
+                        <a:lnSpc>
+                          <a:spcPct val="100000"/>
+                        </a:lnSpc>
+                        <a:buNone/>
+                      </a:pPr>
                       <a:r>
                         <a:rPr b="0" lang="en-GB" sz="1600" spc="-1" strike="noStrike">
                           <a:latin typeface="Arial"/>
@@ -4728,6 +4515,12 @@
                       </a:endParaRPr>
                     </a:p>
                     <a:p>
+                      <a:pPr>
+                        <a:lnSpc>
+                          <a:spcPct val="100000"/>
+                        </a:lnSpc>
+                        <a:buNone/>
+                      </a:pPr>
                       <a:r>
                         <a:rPr b="0" lang="en-GB" sz="1600" spc="-1" strike="noStrike">
                           <a:latin typeface="Arial"/>
@@ -4759,7 +4552,7 @@
                 </a:tc>
                 <a:tc>
                   <a:txBody>
-                    <a:bodyPr lIns="90000" rIns="90000" tIns="46800" bIns="46800" anchor="t">
+                    <a:bodyPr lIns="90000" rIns="90000" anchor="t">
                       <a:noAutofit/>
                     </a:bodyPr>
                     <a:p>
@@ -4777,7 +4570,6 @@
                       </a:r>
                       <a:endParaRPr b="0" lang="en-GB" sz="1600" spc="-1" strike="noStrike">
                         <a:latin typeface="Arial"/>
-                        <a:ea typeface="Noto Sans CJK SC"/>
                       </a:endParaRPr>
                     </a:p>
                     <a:p>
@@ -4795,7 +4587,6 @@
                       </a:r>
                       <a:endParaRPr b="0" lang="en-GB" sz="1600" spc="-1" strike="noStrike">
                         <a:latin typeface="Arial"/>
-                        <a:ea typeface="Noto Sans CJK SC"/>
                       </a:endParaRPr>
                     </a:p>
                   </a:txBody>
@@ -4819,10 +4610,16 @@
                 </a:tc>
                 <a:tc>
                   <a:txBody>
-                    <a:bodyPr lIns="90000" rIns="90000" tIns="46800" bIns="46800" anchor="t">
+                    <a:bodyPr lIns="90000" rIns="90000" anchor="t">
                       <a:noAutofit/>
                     </a:bodyPr>
                     <a:p>
+                      <a:pPr>
+                        <a:lnSpc>
+                          <a:spcPct val="100000"/>
+                        </a:lnSpc>
+                        <a:buNone/>
+                      </a:pPr>
                       <a:r>
                         <a:rPr b="0" lang="en-GB" sz="1600" spc="-1" strike="noStrike">
                           <a:latin typeface="Arial"/>
@@ -4834,6 +4631,12 @@
                       </a:endParaRPr>
                     </a:p>
                     <a:p>
+                      <a:pPr>
+                        <a:lnSpc>
+                          <a:spcPct val="100000"/>
+                        </a:lnSpc>
+                        <a:buNone/>
+                      </a:pPr>
                       <a:r>
                         <a:rPr b="0" lang="en-GB" sz="1600" spc="-1" strike="noStrike">
                           <a:latin typeface="Arial"/>
@@ -4869,10 +4672,16 @@
               <a:tr h="1071720">
                 <a:tc>
                   <a:txBody>
-                    <a:bodyPr lIns="90000" rIns="90000" tIns="46800" bIns="46800" anchor="t">
+                    <a:bodyPr lIns="90000" rIns="90000" anchor="t">
                       <a:noAutofit/>
                     </a:bodyPr>
                     <a:p>
+                      <a:pPr>
+                        <a:lnSpc>
+                          <a:spcPct val="100000"/>
+                        </a:lnSpc>
+                        <a:buNone/>
+                      </a:pPr>
                       <a:r>
                         <a:rPr b="0" lang="en-GB" sz="1600" spc="-1" strike="noStrike">
                           <a:latin typeface="Arial"/>
@@ -4884,6 +4693,12 @@
                       </a:endParaRPr>
                     </a:p>
                     <a:p>
+                      <a:pPr>
+                        <a:lnSpc>
+                          <a:spcPct val="100000"/>
+                        </a:lnSpc>
+                        <a:buNone/>
+                      </a:pPr>
                       <a:r>
                         <a:rPr b="0" lang="en-GB" sz="1600" spc="-1" strike="noStrike">
                           <a:latin typeface="Arial"/>
@@ -4919,10 +4734,16 @@
                 </a:tc>
                 <a:tc>
                   <a:txBody>
-                    <a:bodyPr lIns="90000" rIns="90000" tIns="46800" bIns="46800" anchor="t">
+                    <a:bodyPr lIns="90000" rIns="90000" anchor="t">
                       <a:noAutofit/>
                     </a:bodyPr>
                     <a:p>
+                      <a:pPr>
+                        <a:lnSpc>
+                          <a:spcPct val="100000"/>
+                        </a:lnSpc>
+                        <a:buNone/>
+                      </a:pPr>
                       <a:r>
                         <a:rPr b="0" lang="en-GB" sz="1600" spc="-1" strike="noStrike">
                           <a:latin typeface="Arial"/>
@@ -4934,6 +4755,12 @@
                       </a:endParaRPr>
                     </a:p>
                     <a:p>
+                      <a:pPr>
+                        <a:lnSpc>
+                          <a:spcPct val="100000"/>
+                        </a:lnSpc>
+                        <a:buNone/>
+                      </a:pPr>
                       <a:r>
                         <a:rPr b="0" lang="en-GB" sz="1600" spc="-1" strike="noStrike">
                           <a:latin typeface="Arial"/>
@@ -4951,7 +4778,7 @@
                         <a:srgbClr val="ffffff"/>
                       </a:solidFill>
                     </a:lnL>
-                    <a:lnR>
+                    <a:lnR w="720">
                       <a:noFill/>
                     </a:lnR>
                     <a:lnT>
@@ -4969,10 +4796,16 @@
                 </a:tc>
                 <a:tc>
                   <a:txBody>
-                    <a:bodyPr lIns="90000" rIns="90000" tIns="46800" bIns="46800" anchor="t">
+                    <a:bodyPr lIns="90000" rIns="90000" anchor="t">
                       <a:noAutofit/>
                     </a:bodyPr>
                     <a:p>
+                      <a:pPr>
+                        <a:lnSpc>
+                          <a:spcPct val="100000"/>
+                        </a:lnSpc>
+                        <a:buNone/>
+                      </a:pPr>
                       <a:r>
                         <a:rPr b="0" lang="en-GB" sz="1600" spc="-1" strike="noStrike">
                           <a:latin typeface="Arial"/>
@@ -4984,6 +4817,12 @@
                       </a:endParaRPr>
                     </a:p>
                     <a:p>
+                      <a:pPr>
+                        <a:lnSpc>
+                          <a:spcPct val="100000"/>
+                        </a:lnSpc>
+                        <a:buNone/>
+                      </a:pPr>
                       <a:r>
                         <a:rPr b="0" lang="en-GB" sz="1600" spc="-1" strike="noStrike">
                           <a:latin typeface="Arial"/>
@@ -5023,10 +4862,16 @@
                 </a:tc>
                 <a:tc>
                   <a:txBody>
-                    <a:bodyPr lIns="90000" rIns="90000" tIns="46800" bIns="46800" anchor="t">
+                    <a:bodyPr lIns="90000" rIns="90000" anchor="t">
                       <a:noAutofit/>
                     </a:bodyPr>
                     <a:p>
+                      <a:pPr>
+                        <a:lnSpc>
+                          <a:spcPct val="100000"/>
+                        </a:lnSpc>
+                        <a:buNone/>
+                      </a:pPr>
                       <a:r>
                         <a:rPr b="0" lang="en-GB" sz="1600" spc="-1" strike="noStrike">
                           <a:latin typeface="Arial"/>
@@ -5038,6 +4883,12 @@
                       </a:endParaRPr>
                     </a:p>
                     <a:p>
+                      <a:pPr>
+                        <a:lnSpc>
+                          <a:spcPct val="100000"/>
+                        </a:lnSpc>
+                        <a:buNone/>
+                      </a:pPr>
                       <a:r>
                         <a:rPr b="0" lang="en-GB" sz="1600" spc="-1" strike="noStrike">
                           <a:latin typeface="Arial"/>
@@ -5077,10 +4928,16 @@
                 </a:tc>
                 <a:tc>
                   <a:txBody>
-                    <a:bodyPr lIns="90000" rIns="90000" tIns="46800" bIns="46800" anchor="t">
+                    <a:bodyPr lIns="90000" rIns="90000" anchor="t">
                       <a:noAutofit/>
                     </a:bodyPr>
                     <a:p>
+                      <a:pPr>
+                        <a:lnSpc>
+                          <a:spcPct val="100000"/>
+                        </a:lnSpc>
+                        <a:buNone/>
+                      </a:pPr>
                       <a:r>
                         <a:rPr b="0" lang="en-GB" sz="1600" spc="-1" strike="noStrike">
                           <a:latin typeface="Arial"/>
@@ -5092,6 +4949,12 @@
                       </a:endParaRPr>
                     </a:p>
                     <a:p>
+                      <a:pPr>
+                        <a:lnSpc>
+                          <a:spcPct val="100000"/>
+                        </a:lnSpc>
+                        <a:buNone/>
+                      </a:pPr>
                       <a:r>
                         <a:rPr b="0" lang="en-GB" sz="1600" spc="-1" strike="noStrike">
                           <a:latin typeface="Arial"/>
@@ -5131,10 +4994,16 @@
                 </a:tc>
                 <a:tc>
                   <a:txBody>
-                    <a:bodyPr lIns="90000" rIns="90000" tIns="46800" bIns="46800" anchor="t">
+                    <a:bodyPr lIns="90000" rIns="90000" anchor="t">
                       <a:noAutofit/>
                     </a:bodyPr>
                     <a:p>
+                      <a:pPr>
+                        <a:lnSpc>
+                          <a:spcPct val="100000"/>
+                        </a:lnSpc>
+                        <a:buNone/>
+                      </a:pPr>
                       <a:r>
                         <a:rPr b="0" lang="en-GB" sz="1600" spc="-1" strike="noStrike">
                           <a:latin typeface="Arial"/>
@@ -5146,6 +5015,12 @@
                       </a:endParaRPr>
                     </a:p>
                     <a:p>
+                      <a:pPr>
+                        <a:lnSpc>
+                          <a:spcPct val="100000"/>
+                        </a:lnSpc>
+                        <a:buNone/>
+                      </a:pPr>
                       <a:r>
                         <a:rPr b="0" lang="en-GB" sz="1600" spc="-1" strike="noStrike">
                           <a:latin typeface="Arial"/>
@@ -5181,10 +5056,16 @@
                 </a:tc>
                 <a:tc>
                   <a:txBody>
-                    <a:bodyPr lIns="90000" rIns="90000" tIns="46800" bIns="46800" anchor="t">
+                    <a:bodyPr lIns="90000" rIns="90000" anchor="t">
                       <a:noAutofit/>
                     </a:bodyPr>
                     <a:p>
+                      <a:pPr>
+                        <a:lnSpc>
+                          <a:spcPct val="100000"/>
+                        </a:lnSpc>
+                        <a:buNone/>
+                      </a:pPr>
                       <a:r>
                         <a:rPr b="0" lang="en-GB" sz="1600" spc="-1" strike="noStrike">
                           <a:latin typeface="Arial"/>
@@ -5196,6 +5077,12 @@
                       </a:endParaRPr>
                     </a:p>
                     <a:p>
+                      <a:pPr>
+                        <a:lnSpc>
+                          <a:spcPct val="100000"/>
+                        </a:lnSpc>
+                        <a:buNone/>
+                      </a:pPr>
                       <a:r>
                         <a:rPr b="0" lang="en-GB" sz="1600" spc="-1" strike="noStrike">
                           <a:latin typeface="Arial"/>
@@ -5237,10 +5124,16 @@
               <a:tr h="1364400">
                 <a:tc>
                   <a:txBody>
-                    <a:bodyPr lIns="90000" rIns="90000" tIns="46800" bIns="46800" anchor="t">
+                    <a:bodyPr lIns="90000" rIns="90000" anchor="t">
                       <a:noAutofit/>
                     </a:bodyPr>
                     <a:p>
+                      <a:pPr>
+                        <a:lnSpc>
+                          <a:spcPct val="100000"/>
+                        </a:lnSpc>
+                        <a:buNone/>
+                      </a:pPr>
                       <a:r>
                         <a:rPr b="0" lang="en-GB" sz="1600" spc="-1" strike="noStrike">
                           <a:latin typeface="Arial"/>
@@ -5252,6 +5145,12 @@
                       </a:endParaRPr>
                     </a:p>
                     <a:p>
+                      <a:pPr>
+                        <a:lnSpc>
+                          <a:spcPct val="100000"/>
+                        </a:lnSpc>
+                        <a:buNone/>
+                      </a:pPr>
                       <a:r>
                         <a:rPr b="0" lang="en-GB" sz="1600" spc="-1" strike="noStrike">
                           <a:latin typeface="Arial"/>
@@ -5291,10 +5190,16 @@
                 </a:tc>
                 <a:tc>
                   <a:txBody>
-                    <a:bodyPr lIns="90000" rIns="90000" tIns="46800" bIns="46800" anchor="t">
+                    <a:bodyPr lIns="90000" rIns="90000" anchor="t">
                       <a:noAutofit/>
                     </a:bodyPr>
                     <a:p>
+                      <a:pPr>
+                        <a:lnSpc>
+                          <a:spcPct val="100000"/>
+                        </a:lnSpc>
+                        <a:buNone/>
+                      </a:pPr>
                       <a:r>
                         <a:rPr b="0" lang="en-GB" sz="1600" spc="-1" strike="noStrike">
                           <a:latin typeface="Arial"/>
@@ -5306,6 +5211,12 @@
                       </a:endParaRPr>
                     </a:p>
                     <a:p>
+                      <a:pPr>
+                        <a:lnSpc>
+                          <a:spcPct val="100000"/>
+                        </a:lnSpc>
+                        <a:buNone/>
+                      </a:pPr>
                       <a:r>
                         <a:rPr b="0" lang="en-GB" sz="1600" spc="-1" strike="noStrike">
                           <a:latin typeface="Arial"/>
@@ -5343,10 +5254,16 @@
                 </a:tc>
                 <a:tc>
                   <a:txBody>
-                    <a:bodyPr lIns="90000" rIns="90000" tIns="46800" bIns="46800" anchor="t">
+                    <a:bodyPr lIns="90000" rIns="90000" anchor="t">
                       <a:noAutofit/>
                     </a:bodyPr>
                     <a:p>
+                      <a:pPr>
+                        <a:lnSpc>
+                          <a:spcPct val="100000"/>
+                        </a:lnSpc>
+                        <a:buNone/>
+                      </a:pPr>
                       <a:r>
                         <a:rPr b="0" lang="en-GB" sz="1600" spc="-1" strike="noStrike">
                           <a:latin typeface="Arial"/>
@@ -5358,6 +5275,12 @@
                       </a:endParaRPr>
                     </a:p>
                     <a:p>
+                      <a:pPr>
+                        <a:lnSpc>
+                          <a:spcPct val="100000"/>
+                        </a:lnSpc>
+                        <a:buNone/>
+                      </a:pPr>
                       <a:r>
                         <a:rPr b="0" lang="en-GB" sz="1600" spc="-1" strike="noStrike">
                           <a:latin typeface="Arial"/>
@@ -5375,7 +5298,7 @@
                         <a:srgbClr val="ffffff"/>
                       </a:solidFill>
                     </a:lnL>
-                    <a:lnR>
+                    <a:lnR w="720">
                       <a:noFill/>
                     </a:lnR>
                     <a:lnT>
@@ -5393,10 +5316,16 @@
                 </a:tc>
                 <a:tc>
                   <a:txBody>
-                    <a:bodyPr lIns="90000" rIns="90000" tIns="46800" bIns="46800" anchor="t">
+                    <a:bodyPr lIns="90000" rIns="90000" anchor="t">
                       <a:noAutofit/>
                     </a:bodyPr>
                     <a:p>
+                      <a:pPr>
+                        <a:lnSpc>
+                          <a:spcPct val="100000"/>
+                        </a:lnSpc>
+                        <a:buNone/>
+                      </a:pPr>
                       <a:r>
                         <a:rPr b="0" lang="en-GB" sz="1600" spc="-1" strike="noStrike">
                           <a:latin typeface="Arial"/>
@@ -5408,6 +5337,12 @@
                       </a:endParaRPr>
                     </a:p>
                     <a:p>
+                      <a:pPr>
+                        <a:lnSpc>
+                          <a:spcPct val="100000"/>
+                        </a:lnSpc>
+                        <a:buNone/>
+                      </a:pPr>
                       <a:r>
                         <a:rPr b="0" lang="en-GB" sz="1600" spc="-1" strike="noStrike">
                           <a:latin typeface="Arial"/>
@@ -5419,6 +5354,12 @@
                       </a:endParaRPr>
                     </a:p>
                     <a:p>
+                      <a:pPr>
+                        <a:lnSpc>
+                          <a:spcPct val="100000"/>
+                        </a:lnSpc>
+                        <a:buNone/>
+                      </a:pPr>
                       <a:endParaRPr b="0" lang="en-GB" sz="1600" spc="-1" strike="noStrike">
                         <a:latin typeface="Arial"/>
                       </a:endParaRPr>
@@ -5450,10 +5391,16 @@
                 </a:tc>
                 <a:tc>
                   <a:txBody>
-                    <a:bodyPr lIns="90000" rIns="90000" tIns="46800" bIns="46800" anchor="t">
+                    <a:bodyPr lIns="90000" rIns="90000" anchor="t">
                       <a:noAutofit/>
                     </a:bodyPr>
                     <a:p>
+                      <a:pPr>
+                        <a:lnSpc>
+                          <a:spcPct val="100000"/>
+                        </a:lnSpc>
+                        <a:buNone/>
+                      </a:pPr>
                       <a:r>
                         <a:rPr b="0" lang="en-GB" sz="1600" spc="-1" strike="noStrike">
                           <a:latin typeface="Arial"/>
@@ -5465,6 +5412,12 @@
                       </a:endParaRPr>
                     </a:p>
                     <a:p>
+                      <a:pPr>
+                        <a:lnSpc>
+                          <a:spcPct val="100000"/>
+                        </a:lnSpc>
+                        <a:buNone/>
+                      </a:pPr>
                       <a:r>
                         <a:rPr b="0" lang="en-GB" sz="1600" spc="-1" strike="noStrike">
                           <a:latin typeface="Arial"/>
@@ -5482,7 +5435,7 @@
                         <a:srgbClr val="ffffff"/>
                       </a:solidFill>
                     </a:lnL>
-                    <a:lnR>
+                    <a:lnR w="720">
                       <a:noFill/>
                     </a:lnR>
                     <a:lnT>
@@ -5500,10 +5453,16 @@
                 </a:tc>
                 <a:tc>
                   <a:txBody>
-                    <a:bodyPr lIns="90000" rIns="90000" tIns="46800" bIns="46800" anchor="t">
+                    <a:bodyPr lIns="90000" rIns="90000" anchor="t">
                       <a:noAutofit/>
                     </a:bodyPr>
                     <a:p>
+                      <a:pPr>
+                        <a:lnSpc>
+                          <a:spcPct val="100000"/>
+                        </a:lnSpc>
+                        <a:buNone/>
+                      </a:pPr>
                       <a:r>
                         <a:rPr b="0" lang="en-GB" sz="1600" spc="-1" strike="noStrike">
                           <a:latin typeface="Arial"/>
@@ -5515,6 +5474,12 @@
                       </a:endParaRPr>
                     </a:p>
                     <a:p>
+                      <a:pPr>
+                        <a:lnSpc>
+                          <a:spcPct val="100000"/>
+                        </a:lnSpc>
+                        <a:buNone/>
+                      </a:pPr>
                       <a:r>
                         <a:rPr b="0" lang="en-GB" sz="1600" spc="-1" strike="noStrike">
                           <a:latin typeface="Arial"/>
@@ -5552,10 +5517,16 @@
                 </a:tc>
                 <a:tc>
                   <a:txBody>
-                    <a:bodyPr lIns="90000" rIns="90000" tIns="46800" bIns="46800" anchor="t">
+                    <a:bodyPr lIns="90000" rIns="90000" anchor="t">
                       <a:noAutofit/>
                     </a:bodyPr>
                     <a:p>
+                      <a:pPr>
+                        <a:lnSpc>
+                          <a:spcPct val="100000"/>
+                        </a:lnSpc>
+                        <a:buNone/>
+                      </a:pPr>
                       <a:r>
                         <a:rPr b="0" lang="en-GB" sz="1600" spc="-1" strike="noStrike">
                           <a:latin typeface="Arial"/>
@@ -5567,6 +5538,12 @@
                       </a:endParaRPr>
                     </a:p>
                     <a:p>
+                      <a:pPr>
+                        <a:lnSpc>
+                          <a:spcPct val="100000"/>
+                        </a:lnSpc>
+                        <a:buNone/>
+                      </a:pPr>
                       <a:r>
                         <a:rPr b="0" lang="en-GB" sz="1600" spc="-1" strike="noStrike">
                           <a:latin typeface="Arial"/>
@@ -5604,10 +5581,16 @@
               <a:tr h="1073520">
                 <a:tc>
                   <a:txBody>
-                    <a:bodyPr lIns="90000" rIns="90000" tIns="46800" bIns="46800" anchor="t">
+                    <a:bodyPr lIns="90000" rIns="90000" anchor="t">
                       <a:noAutofit/>
                     </a:bodyPr>
                     <a:p>
+                      <a:pPr>
+                        <a:lnSpc>
+                          <a:spcPct val="100000"/>
+                        </a:lnSpc>
+                        <a:buNone/>
+                      </a:pPr>
                       <a:r>
                         <a:rPr b="0" lang="en-GB" sz="1600" spc="-1" strike="noStrike">
                           <a:latin typeface="Arial"/>
@@ -5619,6 +5602,12 @@
                       </a:endParaRPr>
                     </a:p>
                     <a:p>
+                      <a:pPr>
+                        <a:lnSpc>
+                          <a:spcPct val="100000"/>
+                        </a:lnSpc>
+                        <a:buNone/>
+                      </a:pPr>
                       <a:r>
                         <a:rPr b="0" lang="en-GB" sz="1600" spc="-1" strike="noStrike">
                           <a:latin typeface="Arial"/>
@@ -5654,10 +5643,16 @@
                 </a:tc>
                 <a:tc>
                   <a:txBody>
-                    <a:bodyPr lIns="90000" rIns="90000" tIns="46800" bIns="46800" anchor="t">
+                    <a:bodyPr lIns="90000" rIns="90000" anchor="t">
                       <a:noAutofit/>
                     </a:bodyPr>
                     <a:p>
+                      <a:pPr>
+                        <a:lnSpc>
+                          <a:spcPct val="100000"/>
+                        </a:lnSpc>
+                        <a:buNone/>
+                      </a:pPr>
                       <a:r>
                         <a:rPr b="0" lang="en-GB" sz="1600" spc="-1" strike="noStrike">
                           <a:latin typeface="Arial"/>
@@ -5669,6 +5664,12 @@
                       </a:endParaRPr>
                     </a:p>
                     <a:p>
+                      <a:pPr>
+                        <a:lnSpc>
+                          <a:spcPct val="100000"/>
+                        </a:lnSpc>
+                        <a:buNone/>
+                      </a:pPr>
                       <a:r>
                         <a:rPr b="0" lang="en-GB" sz="1600" spc="-1" strike="noStrike">
                           <a:latin typeface="Arial"/>
@@ -5706,10 +5707,16 @@
                 </a:tc>
                 <a:tc>
                   <a:txBody>
-                    <a:bodyPr lIns="90000" rIns="90000" tIns="46800" bIns="46800" anchor="t">
+                    <a:bodyPr lIns="90000" rIns="90000" anchor="t">
                       <a:noAutofit/>
                     </a:bodyPr>
                     <a:p>
+                      <a:pPr>
+                        <a:lnSpc>
+                          <a:spcPct val="100000"/>
+                        </a:lnSpc>
+                        <a:buNone/>
+                      </a:pPr>
                       <a:r>
                         <a:rPr b="0" lang="en-GB" sz="1600" spc="-1" strike="noStrike">
                           <a:latin typeface="Arial"/>
@@ -5721,6 +5728,12 @@
                       </a:endParaRPr>
                     </a:p>
                     <a:p>
+                      <a:pPr>
+                        <a:lnSpc>
+                          <a:spcPct val="100000"/>
+                        </a:lnSpc>
+                        <a:buNone/>
+                      </a:pPr>
                       <a:r>
                         <a:rPr b="0" lang="en-GB" sz="1600" spc="-1" strike="noStrike">
                           <a:latin typeface="Arial"/>
@@ -5754,10 +5767,16 @@
                 </a:tc>
                 <a:tc>
                   <a:txBody>
-                    <a:bodyPr lIns="90000" rIns="90000" tIns="46800" bIns="46800" anchor="t">
+                    <a:bodyPr lIns="90000" rIns="90000" anchor="t">
                       <a:noAutofit/>
                     </a:bodyPr>
                     <a:p>
+                      <a:pPr>
+                        <a:lnSpc>
+                          <a:spcPct val="100000"/>
+                        </a:lnSpc>
+                        <a:buNone/>
+                      </a:pPr>
                       <a:r>
                         <a:rPr b="0" lang="en-GB" sz="1600" spc="-1" strike="noStrike">
                           <a:latin typeface="Arial"/>
@@ -5769,6 +5788,12 @@
                       </a:endParaRPr>
                     </a:p>
                     <a:p>
+                      <a:pPr>
+                        <a:lnSpc>
+                          <a:spcPct val="100000"/>
+                        </a:lnSpc>
+                        <a:buNone/>
+                      </a:pPr>
                       <a:r>
                         <a:rPr b="0" lang="en-GB" sz="1600" spc="-1" strike="noStrike">
                           <a:latin typeface="Arial"/>
@@ -5806,10 +5831,16 @@
                 </a:tc>
                 <a:tc>
                   <a:txBody>
-                    <a:bodyPr lIns="90000" rIns="90000" tIns="46800" bIns="46800" anchor="t">
+                    <a:bodyPr lIns="90000" rIns="90000" anchor="t">
                       <a:noAutofit/>
                     </a:bodyPr>
                     <a:p>
+                      <a:pPr>
+                        <a:lnSpc>
+                          <a:spcPct val="100000"/>
+                        </a:lnSpc>
+                        <a:buNone/>
+                      </a:pPr>
                       <a:r>
                         <a:rPr b="0" lang="en-GB" sz="1600" spc="-1" strike="noStrike">
                           <a:latin typeface="Arial"/>
@@ -5821,6 +5852,12 @@
                       </a:endParaRPr>
                     </a:p>
                     <a:p>
+                      <a:pPr>
+                        <a:lnSpc>
+                          <a:spcPct val="100000"/>
+                        </a:lnSpc>
+                        <a:buNone/>
+                      </a:pPr>
                       <a:r>
                         <a:rPr b="0" lang="en-GB" sz="1600" spc="-1" strike="noStrike">
                           <a:latin typeface="Arial"/>
@@ -5856,10 +5893,16 @@
                 </a:tc>
                 <a:tc>
                   <a:txBody>
-                    <a:bodyPr lIns="90000" rIns="90000" tIns="46800" bIns="46800" anchor="t">
+                    <a:bodyPr lIns="90000" rIns="90000" anchor="t">
                       <a:noAutofit/>
                     </a:bodyPr>
                     <a:p>
+                      <a:pPr>
+                        <a:lnSpc>
+                          <a:spcPct val="100000"/>
+                        </a:lnSpc>
+                        <a:buNone/>
+                      </a:pPr>
                       <a:r>
                         <a:rPr b="0" lang="en-GB" sz="1600" spc="-1" strike="noStrike">
                           <a:latin typeface="Arial"/>
@@ -5871,6 +5914,12 @@
                       </a:endParaRPr>
                     </a:p>
                     <a:p>
+                      <a:pPr>
+                        <a:lnSpc>
+                          <a:spcPct val="100000"/>
+                        </a:lnSpc>
+                        <a:buNone/>
+                      </a:pPr>
                       <a:r>
                         <a:rPr b="0" lang="en-GB" sz="1600" spc="-1" strike="noStrike">
                           <a:latin typeface="Arial"/>
@@ -5908,10 +5957,16 @@
                 </a:tc>
                 <a:tc>
                   <a:txBody>
-                    <a:bodyPr lIns="90000" rIns="90000" tIns="46800" bIns="46800" anchor="t">
+                    <a:bodyPr lIns="90000" rIns="90000" anchor="t">
                       <a:noAutofit/>
                     </a:bodyPr>
                     <a:p>
+                      <a:pPr>
+                        <a:lnSpc>
+                          <a:spcPct val="100000"/>
+                        </a:lnSpc>
+                        <a:buNone/>
+                      </a:pPr>
                       <a:r>
                         <a:rPr b="0" lang="en-GB" sz="1600" spc="-1" strike="noStrike">
                           <a:latin typeface="Arial"/>
@@ -5923,6 +5978,12 @@
                       </a:endParaRPr>
                     </a:p>
                     <a:p>
+                      <a:pPr>
+                        <a:lnSpc>
+                          <a:spcPct val="100000"/>
+                        </a:lnSpc>
+                        <a:buNone/>
+                      </a:pPr>
                       <a:r>
                         <a:rPr b="0" lang="en-GB" sz="1600" spc="-1" strike="noStrike">
                           <a:latin typeface="Arial"/>
@@ -5976,7 +6037,7 @@
         <p:spPr>
           <a:xfrm>
             <a:off x="4680000" y="38700000"/>
-            <a:ext cx="1080000" cy="1080000"/>
+            <a:ext cx="1079280" cy="1079280"/>
           </a:xfrm>
           <a:prstGeom prst="rect">
             <a:avLst/>
@@ -5999,7 +6060,7 @@
         <p:spPr>
           <a:xfrm>
             <a:off x="360000" y="38700000"/>
-            <a:ext cx="3984840" cy="1153440"/>
+            <a:ext cx="3984120" cy="1152720"/>
           </a:xfrm>
           <a:prstGeom prst="rect">
             <a:avLst/>
@@ -6022,7 +6083,7 @@
         <p:spPr>
           <a:xfrm>
             <a:off x="451080" y="40209480"/>
-            <a:ext cx="3688920" cy="938520"/>
+            <a:ext cx="3688200" cy="937800"/>
           </a:xfrm>
           <a:prstGeom prst="rect">
             <a:avLst/>
@@ -6045,7 +6106,7 @@
         <p:spPr>
           <a:xfrm>
             <a:off x="16439760" y="17214480"/>
-            <a:ext cx="14220000" cy="14220000"/>
+            <a:ext cx="14219280" cy="14219280"/>
           </a:xfrm>
           <a:prstGeom prst="rect">
             <a:avLst/>
@@ -6058,13 +6119,13 @@
       <p:sp>
         <p:nvSpPr>
           <p:cNvPr id="59" name=""/>
-          <p:cNvSpPr txBox="1"/>
+          <p:cNvSpPr/>
           <p:nvPr/>
         </p:nvSpPr>
         <p:spPr>
           <a:xfrm>
             <a:off x="16338600" y="31295160"/>
-            <a:ext cx="14621400" cy="559800"/>
+            <a:ext cx="14620680" cy="559080"/>
           </a:xfrm>
           <a:prstGeom prst="rect">
             <a:avLst/>
@@ -6074,11 +6135,23 @@
             <a:noFill/>
           </a:ln>
         </p:spPr>
+        <p:style>
+          <a:lnRef idx="0"/>
+          <a:fillRef idx="0"/>
+          <a:effectRef idx="0"/>
+          <a:fontRef idx="minor"/>
+        </p:style>
         <p:txBody>
           <a:bodyPr lIns="90000" rIns="90000" tIns="45000" bIns="45000" anchor="t">
             <a:noAutofit/>
           </a:bodyPr>
           <a:p>
+            <a:pPr>
+              <a:lnSpc>
+                <a:spcPct val="100000"/>
+              </a:lnSpc>
+              <a:buNone/>
+            </a:pPr>
             <a:r>
               <a:rPr b="0" lang="en-US" sz="1600" spc="-1" strike="noStrike">
                 <a:solidFill>
@@ -6103,8 +6176,8 @@
         </p:nvSpPr>
         <p:spPr>
           <a:xfrm>
-            <a:off x="16020000" y="32374800"/>
-            <a:ext cx="15120000" cy="5664960"/>
+            <a:off x="16102800" y="32345640"/>
+            <a:ext cx="15036840" cy="5664960"/>
           </a:xfrm>
           <a:prstGeom prst="rect">
             <a:avLst/>
@@ -6195,7 +6268,7 @@
         <p:spPr>
           <a:xfrm>
             <a:off x="26508600" y="35748720"/>
-            <a:ext cx="4768200" cy="4768200"/>
+            <a:ext cx="4767480" cy="4767480"/>
           </a:xfrm>
           <a:prstGeom prst="rect">
             <a:avLst/>
@@ -6208,13 +6281,13 @@
       <p:sp>
         <p:nvSpPr>
           <p:cNvPr id="62" name=""/>
-          <p:cNvSpPr txBox="1"/>
+          <p:cNvSpPr/>
           <p:nvPr/>
         </p:nvSpPr>
         <p:spPr>
           <a:xfrm>
-            <a:off x="26840880" y="40516920"/>
-            <a:ext cx="4512240" cy="1395000"/>
+            <a:off x="27079560" y="40421520"/>
+            <a:ext cx="4511520" cy="1394280"/>
           </a:xfrm>
           <a:prstGeom prst="rect">
             <a:avLst/>
@@ -6224,22 +6297,78 @@
             <a:noFill/>
           </a:ln>
         </p:spPr>
+        <p:style>
+          <a:lnRef idx="0"/>
+          <a:fillRef idx="0"/>
+          <a:effectRef idx="0"/>
+          <a:fontRef idx="minor"/>
+        </p:style>
         <p:txBody>
           <a:bodyPr lIns="90000" rIns="90000" tIns="45000" bIns="45000" anchor="t">
             <a:noAutofit/>
           </a:bodyPr>
           <a:p>
+            <a:pPr>
+              <a:lnSpc>
+                <a:spcPct val="100000"/>
+              </a:lnSpc>
+              <a:buNone/>
+            </a:pPr>
             <a:r>
               <a:rPr b="0" lang="en-US" sz="4400" spc="-1" strike="noStrike">
                 <a:solidFill>
                   <a:srgbClr val="ffffff"/>
                 </a:solidFill>
                 <a:latin typeface="Segoe UI Light"/>
+                <a:ea typeface="DejaVu Sans"/>
               </a:rPr>
               <a:t>To the paper</a:t>
             </a:r>
             <a:endParaRPr b="0" lang="en-GB" sz="4400" spc="-1" strike="noStrike">
               <a:latin typeface="Arial"/>
+            </a:endParaRPr>
+          </a:p>
+        </p:txBody>
+      </p:sp>
+      <p:sp>
+        <p:nvSpPr>
+          <p:cNvPr id="63" name=""/>
+          <p:cNvSpPr txBox="1"/>
+          <p:nvPr/>
+        </p:nvSpPr>
+        <p:spPr>
+          <a:xfrm>
+            <a:off x="2149920" y="27653040"/>
+            <a:ext cx="12780000" cy="469800"/>
+          </a:xfrm>
+          <a:prstGeom prst="rect">
+            <a:avLst/>
+          </a:prstGeom>
+          <a:noFill/>
+          <a:ln w="0">
+            <a:noFill/>
+          </a:ln>
+        </p:spPr>
+        <p:txBody>
+          <a:bodyPr lIns="0" rIns="0" tIns="0" bIns="0" anchor="t">
+            <a:noAutofit/>
+          </a:bodyPr>
+          <a:p>
+            <a:r>
+              <a:rPr b="0" lang="en-US" sz="1600" spc="-1" strike="noStrike">
+                <a:solidFill>
+                  <a:srgbClr val="000000"/>
+                </a:solidFill>
+                <a:latin typeface="Segoe UI"/>
+              </a:rPr>
+              <a:t>Correlations of uncorrected brain age gap and age across used diffusion approaches. Full = all data combined. Mean = multimodal whole-brain averaged metrics.</a:t>
+            </a:r>
+            <a:endParaRPr b="0" lang="en-US" sz="1600" spc="-1" strike="noStrike">
+              <a:solidFill>
+                <a:srgbClr val="000000"/>
+              </a:solidFill>
+              <a:latin typeface="Segoe UI"/>
+              <a:ea typeface="Segoe UI Black"/>
             </a:endParaRPr>
           </a:p>
         </p:txBody>

</xml_diff>